<commit_message>
fix(fonction): relecture du chapitre 5
</commit_message>
<xml_diff>
--- a/source/Chapitre 5 - Les fonctions.pptx
+++ b/source/Chapitre 5 - Les fonctions.pptx
@@ -131,7 +131,7 @@
 <file path=ppt/revisionInfo.xml><?xml version="1.0" encoding="utf-8"?>
 <p1510:revInfo xmlns:a="http://schemas.openxmlformats.org/drawingml/2006/main" xmlns:r="http://schemas.openxmlformats.org/officeDocument/2006/relationships" xmlns:p1510="http://schemas.microsoft.com/office/powerpoint/2015/10/main">
   <p1510:revLst>
-    <p1510:client id="{A4D72469-B357-4109-ADB0-3AA3EC8E657E}" v="74" dt="2023-09-10T10:28:24.605"/>
+    <p1510:client id="{E7E317F0-1E26-4BB4-BF77-FD59F7E1022E}" v="3" dt="2023-09-23T09:29:11.690"/>
   </p1510:revLst>
 </p1510:revInfo>
 </file>
@@ -993,6 +993,272 @@
             <ac:spMk id="6" creationId="{84F10693-2FE8-EFC8-8DB6-84BFD181D260}"/>
           </ac:spMkLst>
         </pc:spChg>
+      </pc:sldChg>
+    </pc:docChg>
+  </pc:docChgLst>
+  <pc:docChgLst>
+    <pc:chgData name="Ismaël Tuo" userId="fca7baf0e513a1e6" providerId="LiveId" clId="{E7E317F0-1E26-4BB4-BF77-FD59F7E1022E}"/>
+    <pc:docChg chg="undo custSel modSld">
+      <pc:chgData name="Ismaël Tuo" userId="fca7baf0e513a1e6" providerId="LiveId" clId="{E7E317F0-1E26-4BB4-BF77-FD59F7E1022E}" dt="2023-09-23T09:36:08.017" v="84" actId="1076"/>
+      <pc:docMkLst>
+        <pc:docMk/>
+      </pc:docMkLst>
+      <pc:sldChg chg="modSp mod">
+        <pc:chgData name="Ismaël Tuo" userId="fca7baf0e513a1e6" providerId="LiveId" clId="{E7E317F0-1E26-4BB4-BF77-FD59F7E1022E}" dt="2023-09-23T08:58:31.589" v="8" actId="20577"/>
+        <pc:sldMkLst>
+          <pc:docMk/>
+          <pc:sldMk cId="2639441608" sldId="286"/>
+        </pc:sldMkLst>
+        <pc:spChg chg="mod">
+          <ac:chgData name="Ismaël Tuo" userId="fca7baf0e513a1e6" providerId="LiveId" clId="{E7E317F0-1E26-4BB4-BF77-FD59F7E1022E}" dt="2023-09-23T08:58:31.589" v="8" actId="20577"/>
+          <ac:spMkLst>
+            <pc:docMk/>
+            <pc:sldMk cId="2639441608" sldId="286"/>
+            <ac:spMk id="9" creationId="{F2560FA0-6BE4-8D1C-8835-15F5D1EF3AC2}"/>
+          </ac:spMkLst>
+        </pc:spChg>
+        <pc:spChg chg="mod">
+          <ac:chgData name="Ismaël Tuo" userId="fca7baf0e513a1e6" providerId="LiveId" clId="{E7E317F0-1E26-4BB4-BF77-FD59F7E1022E}" dt="2023-09-23T08:58:02.826" v="0" actId="20577"/>
+          <ac:spMkLst>
+            <pc:docMk/>
+            <pc:sldMk cId="2639441608" sldId="286"/>
+            <ac:spMk id="11" creationId="{C27A3656-3CB0-8161-AE9F-B92FBE4F5083}"/>
+          </ac:spMkLst>
+        </pc:spChg>
+      </pc:sldChg>
+      <pc:sldChg chg="addSp delSp modSp mod">
+        <pc:chgData name="Ismaël Tuo" userId="fca7baf0e513a1e6" providerId="LiveId" clId="{E7E317F0-1E26-4BB4-BF77-FD59F7E1022E}" dt="2023-09-23T09:05:37.776" v="23" actId="14100"/>
+        <pc:sldMkLst>
+          <pc:docMk/>
+          <pc:sldMk cId="2730775639" sldId="288"/>
+        </pc:sldMkLst>
+        <pc:picChg chg="add mod">
+          <ac:chgData name="Ismaël Tuo" userId="fca7baf0e513a1e6" providerId="LiveId" clId="{E7E317F0-1E26-4BB4-BF77-FD59F7E1022E}" dt="2023-09-23T09:04:53.976" v="15" actId="1076"/>
+          <ac:picMkLst>
+            <pc:docMk/>
+            <pc:sldMk cId="2730775639" sldId="288"/>
+            <ac:picMk id="7" creationId="{335DF13C-F77B-F769-D76D-2D2B572ED6F6}"/>
+          </ac:picMkLst>
+        </pc:picChg>
+        <pc:picChg chg="del">
+          <ac:chgData name="Ismaël Tuo" userId="fca7baf0e513a1e6" providerId="LiveId" clId="{E7E317F0-1E26-4BB4-BF77-FD59F7E1022E}" dt="2023-09-23T09:04:44.278" v="9" actId="478"/>
+          <ac:picMkLst>
+            <pc:docMk/>
+            <pc:sldMk cId="2730775639" sldId="288"/>
+            <ac:picMk id="9" creationId="{4286593D-00D0-626D-7996-1E5BA50EECD0}"/>
+          </ac:picMkLst>
+        </pc:picChg>
+        <pc:picChg chg="add mod">
+          <ac:chgData name="Ismaël Tuo" userId="fca7baf0e513a1e6" providerId="LiveId" clId="{E7E317F0-1E26-4BB4-BF77-FD59F7E1022E}" dt="2023-09-23T09:05:37.776" v="23" actId="14100"/>
+          <ac:picMkLst>
+            <pc:docMk/>
+            <pc:sldMk cId="2730775639" sldId="288"/>
+            <ac:picMk id="10" creationId="{937F6479-366A-09D3-A69F-488842581D68}"/>
+          </ac:picMkLst>
+        </pc:picChg>
+        <pc:picChg chg="del">
+          <ac:chgData name="Ismaël Tuo" userId="fca7baf0e513a1e6" providerId="LiveId" clId="{E7E317F0-1E26-4BB4-BF77-FD59F7E1022E}" dt="2023-09-23T09:05:20.602" v="16" actId="478"/>
+          <ac:picMkLst>
+            <pc:docMk/>
+            <pc:sldMk cId="2730775639" sldId="288"/>
+            <ac:picMk id="14" creationId="{8E35E423-12EB-1B4F-28EF-B4BDC0ADAF21}"/>
+          </ac:picMkLst>
+        </pc:picChg>
+      </pc:sldChg>
+      <pc:sldChg chg="addSp delSp modSp mod">
+        <pc:chgData name="Ismaël Tuo" userId="fca7baf0e513a1e6" providerId="LiveId" clId="{E7E317F0-1E26-4BB4-BF77-FD59F7E1022E}" dt="2023-09-23T09:07:44.684" v="37" actId="14100"/>
+        <pc:sldMkLst>
+          <pc:docMk/>
+          <pc:sldMk cId="2940181209" sldId="290"/>
+        </pc:sldMkLst>
+        <pc:picChg chg="del">
+          <ac:chgData name="Ismaël Tuo" userId="fca7baf0e513a1e6" providerId="LiveId" clId="{E7E317F0-1E26-4BB4-BF77-FD59F7E1022E}" dt="2023-09-23T09:06:44.209" v="24" actId="478"/>
+          <ac:picMkLst>
+            <pc:docMk/>
+            <pc:sldMk cId="2940181209" sldId="290"/>
+            <ac:picMk id="8" creationId="{4A8E6581-F7C4-F8ED-7F5B-C931CB61E5A4}"/>
+          </ac:picMkLst>
+        </pc:picChg>
+        <pc:picChg chg="add mod">
+          <ac:chgData name="Ismaël Tuo" userId="fca7baf0e513a1e6" providerId="LiveId" clId="{E7E317F0-1E26-4BB4-BF77-FD59F7E1022E}" dt="2023-09-23T09:06:50.684" v="28" actId="1076"/>
+          <ac:picMkLst>
+            <pc:docMk/>
+            <pc:sldMk cId="2940181209" sldId="290"/>
+            <ac:picMk id="10" creationId="{6E4C53E9-04F2-EAC1-DDF9-4F94F9A58D24}"/>
+          </ac:picMkLst>
+        </pc:picChg>
+        <pc:picChg chg="del">
+          <ac:chgData name="Ismaël Tuo" userId="fca7baf0e513a1e6" providerId="LiveId" clId="{E7E317F0-1E26-4BB4-BF77-FD59F7E1022E}" dt="2023-09-23T09:07:27.781" v="29" actId="478"/>
+          <ac:picMkLst>
+            <pc:docMk/>
+            <pc:sldMk cId="2940181209" sldId="290"/>
+            <ac:picMk id="12" creationId="{8808253D-58D7-51CE-3190-AFA5B8F1A787}"/>
+          </ac:picMkLst>
+        </pc:picChg>
+        <pc:picChg chg="add mod">
+          <ac:chgData name="Ismaël Tuo" userId="fca7baf0e513a1e6" providerId="LiveId" clId="{E7E317F0-1E26-4BB4-BF77-FD59F7E1022E}" dt="2023-09-23T09:07:44.684" v="37" actId="14100"/>
+          <ac:picMkLst>
+            <pc:docMk/>
+            <pc:sldMk cId="2940181209" sldId="290"/>
+            <ac:picMk id="14" creationId="{C89D46CC-FEDD-815C-C38D-C2092934AC02}"/>
+          </ac:picMkLst>
+        </pc:picChg>
+      </pc:sldChg>
+      <pc:sldChg chg="addSp delSp modSp mod">
+        <pc:chgData name="Ismaël Tuo" userId="fca7baf0e513a1e6" providerId="LiveId" clId="{E7E317F0-1E26-4BB4-BF77-FD59F7E1022E}" dt="2023-09-23T09:20:09.389" v="48" actId="1076"/>
+        <pc:sldMkLst>
+          <pc:docMk/>
+          <pc:sldMk cId="3611994866" sldId="291"/>
+        </pc:sldMkLst>
+        <pc:spChg chg="mod">
+          <ac:chgData name="Ismaël Tuo" userId="fca7baf0e513a1e6" providerId="LiveId" clId="{E7E317F0-1E26-4BB4-BF77-FD59F7E1022E}" dt="2023-09-23T09:20:09.389" v="48" actId="1076"/>
+          <ac:spMkLst>
+            <pc:docMk/>
+            <pc:sldMk cId="3611994866" sldId="291"/>
+            <ac:spMk id="8" creationId="{B1006DBB-B0AD-9226-A74C-AA09F89D0A43}"/>
+          </ac:spMkLst>
+        </pc:spChg>
+        <pc:picChg chg="del">
+          <ac:chgData name="Ismaël Tuo" userId="fca7baf0e513a1e6" providerId="LiveId" clId="{E7E317F0-1E26-4BB4-BF77-FD59F7E1022E}" dt="2023-09-23T09:15:04.746" v="38" actId="478"/>
+          <ac:picMkLst>
+            <pc:docMk/>
+            <pc:sldMk cId="3611994866" sldId="291"/>
+            <ac:picMk id="7" creationId="{123F22D3-CA8A-C400-B9B3-92CE6E326CBA}"/>
+          </ac:picMkLst>
+        </pc:picChg>
+        <pc:picChg chg="add mod">
+          <ac:chgData name="Ismaël Tuo" userId="fca7baf0e513a1e6" providerId="LiveId" clId="{E7E317F0-1E26-4BB4-BF77-FD59F7E1022E}" dt="2023-09-23T09:15:23.117" v="43" actId="1076"/>
+          <ac:picMkLst>
+            <pc:docMk/>
+            <pc:sldMk cId="3611994866" sldId="291"/>
+            <ac:picMk id="9" creationId="{3900F89A-AD78-6696-8C65-CE39A3AD73F5}"/>
+          </ac:picMkLst>
+        </pc:picChg>
+        <pc:picChg chg="del">
+          <ac:chgData name="Ismaël Tuo" userId="fca7baf0e513a1e6" providerId="LiveId" clId="{E7E317F0-1E26-4BB4-BF77-FD59F7E1022E}" dt="2023-09-23T09:19:56.559" v="44" actId="478"/>
+          <ac:picMkLst>
+            <pc:docMk/>
+            <pc:sldMk cId="3611994866" sldId="291"/>
+            <ac:picMk id="10" creationId="{27C612EC-254B-0FB5-C8D6-1A7635EF5C62}"/>
+          </ac:picMkLst>
+        </pc:picChg>
+        <pc:picChg chg="add mod">
+          <ac:chgData name="Ismaël Tuo" userId="fca7baf0e513a1e6" providerId="LiveId" clId="{E7E317F0-1E26-4BB4-BF77-FD59F7E1022E}" dt="2023-09-23T09:20:03.972" v="47" actId="14100"/>
+          <ac:picMkLst>
+            <pc:docMk/>
+            <pc:sldMk cId="3611994866" sldId="291"/>
+            <ac:picMk id="14" creationId="{CA68ED7D-4685-4BD3-77C2-B9A1BD4E7A60}"/>
+          </ac:picMkLst>
+        </pc:picChg>
+      </pc:sldChg>
+      <pc:sldChg chg="modSp mod">
+        <pc:chgData name="Ismaël Tuo" userId="fca7baf0e513a1e6" providerId="LiveId" clId="{E7E317F0-1E26-4BB4-BF77-FD59F7E1022E}" dt="2023-09-23T09:36:08.017" v="84" actId="1076"/>
+        <pc:sldMkLst>
+          <pc:docMk/>
+          <pc:sldMk cId="389737552" sldId="292"/>
+        </pc:sldMkLst>
+        <pc:spChg chg="mod">
+          <ac:chgData name="Ismaël Tuo" userId="fca7baf0e513a1e6" providerId="LiveId" clId="{E7E317F0-1E26-4BB4-BF77-FD59F7E1022E}" dt="2023-09-23T09:36:08.017" v="84" actId="1076"/>
+          <ac:spMkLst>
+            <pc:docMk/>
+            <pc:sldMk cId="389737552" sldId="292"/>
+            <ac:spMk id="12" creationId="{F2D7612E-14E4-8894-0CAF-CFEA68F56803}"/>
+          </ac:spMkLst>
+        </pc:spChg>
+        <pc:spChg chg="mod">
+          <ac:chgData name="Ismaël Tuo" userId="fca7baf0e513a1e6" providerId="LiveId" clId="{E7E317F0-1E26-4BB4-BF77-FD59F7E1022E}" dt="2023-09-23T09:36:01.837" v="83" actId="1076"/>
+          <ac:spMkLst>
+            <pc:docMk/>
+            <pc:sldMk cId="389737552" sldId="292"/>
+            <ac:spMk id="13" creationId="{80EA093C-5FE7-F594-090E-EEAAD5DEFEA6}"/>
+          </ac:spMkLst>
+        </pc:spChg>
+        <pc:picChg chg="mod">
+          <ac:chgData name="Ismaël Tuo" userId="fca7baf0e513a1e6" providerId="LiveId" clId="{E7E317F0-1E26-4BB4-BF77-FD59F7E1022E}" dt="2023-09-23T09:35:54.549" v="81" actId="14100"/>
+          <ac:picMkLst>
+            <pc:docMk/>
+            <pc:sldMk cId="389737552" sldId="292"/>
+            <ac:picMk id="8" creationId="{9F9D938C-1DB8-7679-C48B-20076700DDC4}"/>
+          </ac:picMkLst>
+        </pc:picChg>
+        <pc:picChg chg="mod">
+          <ac:chgData name="Ismaël Tuo" userId="fca7baf0e513a1e6" providerId="LiveId" clId="{E7E317F0-1E26-4BB4-BF77-FD59F7E1022E}" dt="2023-09-23T09:35:57.542" v="82" actId="14100"/>
+          <ac:picMkLst>
+            <pc:docMk/>
+            <pc:sldMk cId="389737552" sldId="292"/>
+            <ac:picMk id="10" creationId="{D32AF948-C73D-6452-217B-DDC1ABE14D0A}"/>
+          </ac:picMkLst>
+        </pc:picChg>
+      </pc:sldChg>
+      <pc:sldChg chg="modSp mod">
+        <pc:chgData name="Ismaël Tuo" userId="fca7baf0e513a1e6" providerId="LiveId" clId="{E7E317F0-1E26-4BB4-BF77-FD59F7E1022E}" dt="2023-09-23T09:24:15.463" v="52" actId="14100"/>
+        <pc:sldMkLst>
+          <pc:docMk/>
+          <pc:sldMk cId="687520318" sldId="294"/>
+        </pc:sldMkLst>
+        <pc:picChg chg="mod">
+          <ac:chgData name="Ismaël Tuo" userId="fca7baf0e513a1e6" providerId="LiveId" clId="{E7E317F0-1E26-4BB4-BF77-FD59F7E1022E}" dt="2023-09-23T09:24:15.463" v="52" actId="14100"/>
+          <ac:picMkLst>
+            <pc:docMk/>
+            <pc:sldMk cId="687520318" sldId="294"/>
+            <ac:picMk id="10" creationId="{C07B2BDB-3DC5-C6FA-1291-9DB6A9FE778F}"/>
+          </ac:picMkLst>
+        </pc:picChg>
+      </pc:sldChg>
+      <pc:sldChg chg="addSp delSp modSp mod">
+        <pc:chgData name="Ismaël Tuo" userId="fca7baf0e513a1e6" providerId="LiveId" clId="{E7E317F0-1E26-4BB4-BF77-FD59F7E1022E}" dt="2023-09-23T09:32:54.158" v="79" actId="14100"/>
+        <pc:sldMkLst>
+          <pc:docMk/>
+          <pc:sldMk cId="4049529178" sldId="295"/>
+        </pc:sldMkLst>
+        <pc:picChg chg="add del mod">
+          <ac:chgData name="Ismaël Tuo" userId="fca7baf0e513a1e6" providerId="LiveId" clId="{E7E317F0-1E26-4BB4-BF77-FD59F7E1022E}" dt="2023-09-23T09:29:01.382" v="59" actId="478"/>
+          <ac:picMkLst>
+            <pc:docMk/>
+            <pc:sldMk cId="4049529178" sldId="295"/>
+            <ac:picMk id="2" creationId="{CD0E6FBA-23CC-D990-6EE1-B892EC101928}"/>
+          </ac:picMkLst>
+        </pc:picChg>
+        <pc:picChg chg="add del mod">
+          <ac:chgData name="Ismaël Tuo" userId="fca7baf0e513a1e6" providerId="LiveId" clId="{E7E317F0-1E26-4BB4-BF77-FD59F7E1022E}" dt="2023-09-23T09:31:13.271" v="65" actId="478"/>
+          <ac:picMkLst>
+            <pc:docMk/>
+            <pc:sldMk cId="4049529178" sldId="295"/>
+            <ac:picMk id="8" creationId="{7179CAF5-B296-1995-5420-F75EF0EE5C94}"/>
+          </ac:picMkLst>
+        </pc:picChg>
+        <pc:picChg chg="add del mod">
+          <ac:chgData name="Ismaël Tuo" userId="fca7baf0e513a1e6" providerId="LiveId" clId="{E7E317F0-1E26-4BB4-BF77-FD59F7E1022E}" dt="2023-09-23T09:32:29.323" v="71" actId="478"/>
+          <ac:picMkLst>
+            <pc:docMk/>
+            <pc:sldMk cId="4049529178" sldId="295"/>
+            <ac:picMk id="10" creationId="{57D03C1E-0019-2109-4343-19532F7AFED0}"/>
+          </ac:picMkLst>
+        </pc:picChg>
+        <pc:picChg chg="add mod">
+          <ac:chgData name="Ismaël Tuo" userId="fca7baf0e513a1e6" providerId="LiveId" clId="{E7E317F0-1E26-4BB4-BF77-FD59F7E1022E}" dt="2023-09-23T09:32:54.158" v="79" actId="14100"/>
+          <ac:picMkLst>
+            <pc:docMk/>
+            <pc:sldMk cId="4049529178" sldId="295"/>
+            <ac:picMk id="13" creationId="{5354A47B-8AE3-B68B-6EB0-DF563C89FCA4}"/>
+          </ac:picMkLst>
+        </pc:picChg>
+        <pc:picChg chg="add mod">
+          <ac:chgData name="Ismaël Tuo" userId="fca7baf0e513a1e6" providerId="LiveId" clId="{E7E317F0-1E26-4BB4-BF77-FD59F7E1022E}" dt="2023-09-23T09:32:47.627" v="77" actId="14100"/>
+          <ac:picMkLst>
+            <pc:docMk/>
+            <pc:sldMk cId="4049529178" sldId="295"/>
+            <ac:picMk id="15" creationId="{BE1F63BE-80A7-FE27-3C3F-C9E93C2AF7D4}"/>
+          </ac:picMkLst>
+        </pc:picChg>
+        <pc:picChg chg="del mod">
+          <ac:chgData name="Ismaël Tuo" userId="fca7baf0e513a1e6" providerId="LiveId" clId="{E7E317F0-1E26-4BB4-BF77-FD59F7E1022E}" dt="2023-09-23T09:30:42.800" v="62" actId="478"/>
+          <ac:picMkLst>
+            <pc:docMk/>
+            <pc:sldMk cId="4049529178" sldId="295"/>
+            <ac:picMk id="16" creationId="{A378714C-B387-DDFD-BE7A-02ED13BE7BC5}"/>
+          </ac:picMkLst>
+        </pc:picChg>
       </pc:sldChg>
     </pc:docChg>
   </pc:docChgLst>
@@ -1081,7 +1347,7 @@
           <a:p>
             <a:fld id="{5D1B8971-FAD5-A544-A565-5C81831E2E08}" type="datetimeFigureOut">
               <a:rPr lang="fr-FR" smtClean="0"/>
-              <a:t>10/09/2023</a:t>
+              <a:t>23/09/2023</a:t>
             </a:fld>
             <a:endParaRPr lang="fr-FR"/>
           </a:p>
@@ -1511,7 +1777,7 @@
           <a:p>
             <a:fld id="{446AF453-C717-E044-9B61-C449088DBB9F}" type="datetime1">
               <a:rPr lang="fr-FR" smtClean="0"/>
-              <a:t>10/09/2023</a:t>
+              <a:t>23/09/2023</a:t>
             </a:fld>
             <a:endParaRPr lang="fr-FR"/>
           </a:p>
@@ -1685,7 +1951,7 @@
           <a:p>
             <a:fld id="{0AD74B8B-4B66-A54B-A7E1-EB9F6C09CE67}" type="datetime1">
               <a:rPr lang="fr-FR" smtClean="0"/>
-              <a:t>10/09/2023</a:t>
+              <a:t>23/09/2023</a:t>
             </a:fld>
             <a:endParaRPr lang="fr-FR"/>
           </a:p>
@@ -1869,7 +2135,7 @@
           <a:p>
             <a:fld id="{9584F9F2-42A0-CD42-8013-986AEAF97421}" type="datetime1">
               <a:rPr lang="fr-FR" smtClean="0"/>
-              <a:t>10/09/2023</a:t>
+              <a:t>23/09/2023</a:t>
             </a:fld>
             <a:endParaRPr lang="fr-FR"/>
           </a:p>
@@ -2043,7 +2309,7 @@
           <a:p>
             <a:fld id="{DAB9BD9F-3179-BB4C-96AB-C40862581685}" type="datetime1">
               <a:rPr lang="fr-FR" smtClean="0"/>
-              <a:t>10/09/2023</a:t>
+              <a:t>23/09/2023</a:t>
             </a:fld>
             <a:endParaRPr lang="fr-FR"/>
           </a:p>
@@ -2315,7 +2581,7 @@
           <a:p>
             <a:fld id="{A664DE96-64FF-BC43-8A9C-18ED43A528D6}" type="datetime1">
               <a:rPr lang="fr-FR" smtClean="0"/>
-              <a:t>10/09/2023</a:t>
+              <a:t>23/09/2023</a:t>
             </a:fld>
             <a:endParaRPr lang="fr-FR"/>
           </a:p>
@@ -2551,7 +2817,7 @@
           <a:p>
             <a:fld id="{2C8FE800-9F9B-1C4F-A1CD-9EF46842C4CA}" type="datetime1">
               <a:rPr lang="fr-FR" smtClean="0"/>
-              <a:t>10/09/2023</a:t>
+              <a:t>23/09/2023</a:t>
             </a:fld>
             <a:endParaRPr lang="fr-FR"/>
           </a:p>
@@ -2914,7 +3180,7 @@
           <a:p>
             <a:fld id="{0F7DED4E-8CB4-EF40-A349-EFC02EC7784E}" type="datetime1">
               <a:rPr lang="fr-FR" smtClean="0"/>
-              <a:t>10/09/2023</a:t>
+              <a:t>23/09/2023</a:t>
             </a:fld>
             <a:endParaRPr lang="fr-FR"/>
           </a:p>
@@ -3059,7 +3325,7 @@
           <a:p>
             <a:fld id="{5BB88D77-E8A2-E24F-81D2-817E60779F3E}" type="datetime1">
               <a:rPr lang="fr-FR" smtClean="0"/>
-              <a:t>10/09/2023</a:t>
+              <a:t>23/09/2023</a:t>
             </a:fld>
             <a:endParaRPr lang="fr-FR"/>
           </a:p>
@@ -3158,7 +3424,7 @@
           <a:p>
             <a:fld id="{817F964E-5B57-884A-A1B8-925BFA5276AF}" type="datetime1">
               <a:rPr lang="fr-FR" smtClean="0"/>
-              <a:t>10/09/2023</a:t>
+              <a:t>23/09/2023</a:t>
             </a:fld>
             <a:endParaRPr lang="fr-FR"/>
           </a:p>
@@ -3519,7 +3785,7 @@
           <a:p>
             <a:fld id="{D5636CD0-A2E6-1543-A0E5-C829C16FEE55}" type="datetime1">
               <a:rPr lang="fr-FR" smtClean="0"/>
-              <a:t>10/09/2023</a:t>
+              <a:t>23/09/2023</a:t>
             </a:fld>
             <a:endParaRPr lang="fr-FR"/>
           </a:p>
@@ -3880,7 +4146,7 @@
           <a:p>
             <a:fld id="{CEE5CE4A-5B1A-1846-BA66-722BDB7A9525}" type="datetime1">
               <a:rPr lang="fr-FR" smtClean="0"/>
-              <a:t>10/09/2023</a:t>
+              <a:t>23/09/2023</a:t>
             </a:fld>
             <a:endParaRPr lang="fr-FR"/>
           </a:p>
@@ -4127,7 +4393,7 @@
           <a:p>
             <a:fld id="{55A13D9C-CA6E-9C45-8634-4423EBFFD553}" type="datetime1">
               <a:rPr lang="fr-FR" smtClean="0"/>
-              <a:t>10/09/2023</a:t>
+              <a:t>23/09/2023</a:t>
             </a:fld>
             <a:endParaRPr lang="fr-FR"/>
           </a:p>
@@ -5145,10 +5411,10 @@
       </p:cxnSp>
       <p:pic>
         <p:nvPicPr>
-          <p:cNvPr id="16" name="Image 15">
+          <p:cNvPr id="13" name="Image 12">
             <a:extLst>
               <a:ext uri="{FF2B5EF4-FFF2-40B4-BE49-F238E27FC236}">
-                <a16:creationId xmlns:a16="http://schemas.microsoft.com/office/drawing/2014/main" id="{A378714C-B387-DDFD-BE7A-02ED13BE7BC5}"/>
+                <a16:creationId xmlns:a16="http://schemas.microsoft.com/office/drawing/2014/main" id="{5354A47B-8AE3-B68B-6EB0-DF563C89FCA4}"/>
               </a:ext>
             </a:extLst>
           </p:cNvPr>
@@ -5165,8 +5431,38 @@
         </p:blipFill>
         <p:spPr>
           <a:xfrm>
-            <a:off x="899284" y="1058733"/>
-            <a:ext cx="9382926" cy="5159187"/>
+            <a:off x="475919" y="3789976"/>
+            <a:ext cx="11203463" cy="2446232"/>
+          </a:xfrm>
+          <a:prstGeom prst="rect">
+            <a:avLst/>
+          </a:prstGeom>
+        </p:spPr>
+      </p:pic>
+      <p:pic>
+        <p:nvPicPr>
+          <p:cNvPr id="15" name="Image 14">
+            <a:extLst>
+              <a:ext uri="{FF2B5EF4-FFF2-40B4-BE49-F238E27FC236}">
+                <a16:creationId xmlns:a16="http://schemas.microsoft.com/office/drawing/2014/main" id="{BE1F63BE-80A7-FE27-3C3F-C9E93C2AF7D4}"/>
+              </a:ext>
+            </a:extLst>
+          </p:cNvPr>
+          <p:cNvPicPr>
+            <a:picLocks noChangeAspect="1"/>
+          </p:cNvPicPr>
+          <p:nvPr/>
+        </p:nvPicPr>
+        <p:blipFill>
+          <a:blip r:embed="rId3"/>
+          <a:stretch>
+            <a:fillRect/>
+          </a:stretch>
+        </p:blipFill>
+        <p:spPr>
+          <a:xfrm>
+            <a:off x="475919" y="1080301"/>
+            <a:ext cx="11151779" cy="2645546"/>
           </a:xfrm>
           <a:prstGeom prst="rect">
             <a:avLst/>
@@ -5532,8 +5828,8 @@
         </p:blipFill>
         <p:spPr>
           <a:xfrm>
-            <a:off x="500932" y="3191441"/>
-            <a:ext cx="4671465" cy="2039316"/>
+            <a:off x="500932" y="3191440"/>
+            <a:ext cx="4671465" cy="2283455"/>
           </a:xfrm>
           <a:prstGeom prst="rect">
             <a:avLst/>
@@ -5563,7 +5859,7 @@
         <p:spPr>
           <a:xfrm>
             <a:off x="6932397" y="2947301"/>
-            <a:ext cx="4519052" cy="2283456"/>
+            <a:ext cx="4519052" cy="2593420"/>
           </a:xfrm>
           <a:prstGeom prst="rect">
             <a:avLst/>
@@ -5584,7 +5880,7 @@
         </p:nvSpPr>
         <p:spPr>
           <a:xfrm>
-            <a:off x="397564" y="5354910"/>
+            <a:off x="463172" y="5525378"/>
             <a:ext cx="11178450" cy="707886"/>
           </a:xfrm>
           <a:prstGeom prst="rect">
@@ -5629,7 +5925,7 @@
         </p:nvSpPr>
         <p:spPr>
           <a:xfrm>
-            <a:off x="5450185" y="3997407"/>
+            <a:off x="5365696" y="4030265"/>
             <a:ext cx="1373402" cy="584425"/>
           </a:xfrm>
           <a:prstGeom prst="rightArrow">
@@ -6794,7 +7090,7 @@
         <p:spPr>
           <a:xfrm>
             <a:off x="419077" y="804806"/>
-            <a:ext cx="11178450" cy="1015663"/>
+            <a:ext cx="11178450" cy="707886"/>
           </a:xfrm>
           <a:prstGeom prst="rect">
             <a:avLst/>
@@ -6819,7 +7115,7 @@
                 <a:latin typeface="Times New Roman" panose="02020603050405020304" pitchFamily="18" charset="0"/>
                 <a:cs typeface="Times New Roman" panose="02020603050405020304" pitchFamily="18" charset="0"/>
               </a:rPr>
-              <a:t>Les fonctions permettent de regrouper plusieurs instructions dans un bloc qui sera appelé grâce à un nom. Par exemple le </a:t>
+              <a:t>Les fonctions permettent de regrouper plusieurs instructions dans un bloc qui sera appelé grâce à un nom. Par exemple </a:t>
             </a:r>
             <a:r>
               <a:rPr lang="fr-FR" b="1" dirty="0" err="1">
@@ -7046,7 +7342,7 @@
             <a:pPr algn="ctr"/>
             <a:r>
               <a:rPr lang="fr-FR" dirty="0"/>
-              <a:t>Regrouper en fonction avec un nom exemple </a:t>
+              <a:t>Regrouper en fonction avec pour nom par exemple </a:t>
             </a:r>
             <a:r>
               <a:rPr lang="fr-FR" dirty="0" err="1"/>
@@ -8239,12 +8535,96 @@
           </a:fontRef>
         </p:style>
       </p:cxnSp>
+      <p:sp>
+        <p:nvSpPr>
+          <p:cNvPr id="12" name="ZoneTexte 11">
+            <a:extLst>
+              <a:ext uri="{FF2B5EF4-FFF2-40B4-BE49-F238E27FC236}">
+                <a16:creationId xmlns:a16="http://schemas.microsoft.com/office/drawing/2014/main" id="{E0336AEF-7FCA-1E66-4B7F-7E9EC9530BBA}"/>
+              </a:ext>
+            </a:extLst>
+          </p:cNvPr>
+          <p:cNvSpPr txBox="1"/>
+          <p:nvPr/>
+        </p:nvSpPr>
+        <p:spPr>
+          <a:xfrm>
+            <a:off x="227446" y="3305280"/>
+            <a:ext cx="11178450" cy="707886"/>
+          </a:xfrm>
+          <a:prstGeom prst="rect">
+            <a:avLst/>
+          </a:prstGeom>
+          <a:noFill/>
+        </p:spPr>
+        <p:txBody>
+          <a:bodyPr wrap="square" rtlCol="0">
+            <a:spAutoFit/>
+          </a:bodyPr>
+          <a:lstStyle>
+            <a:defPPr>
+              <a:defRPr lang="en-US"/>
+            </a:defPPr>
+            <a:lvl1pPr>
+              <a:defRPr sz="2000"/>
+            </a:lvl1pPr>
+          </a:lstStyle>
+          <a:p>
+            <a:r>
+              <a:rPr lang="fr-FR" dirty="0">
+                <a:latin typeface="Times New Roman" panose="02020603050405020304" pitchFamily="18" charset="0"/>
+                <a:cs typeface="Times New Roman" panose="02020603050405020304" pitchFamily="18" charset="0"/>
+              </a:rPr>
+              <a:t>Modifions la fonction pour prendre un paramètre chaine de caractères appelé </a:t>
+            </a:r>
+            <a:r>
+              <a:rPr lang="fr-FR" b="1" dirty="0">
+                <a:latin typeface="Times New Roman" panose="02020603050405020304" pitchFamily="18" charset="0"/>
+                <a:cs typeface="Times New Roman" panose="02020603050405020304" pitchFamily="18" charset="0"/>
+              </a:rPr>
+              <a:t>nom</a:t>
+            </a:r>
+            <a:r>
+              <a:rPr lang="fr-FR" dirty="0">
+                <a:latin typeface="Times New Roman" panose="02020603050405020304" pitchFamily="18" charset="0"/>
+                <a:cs typeface="Times New Roman" panose="02020603050405020304" pitchFamily="18" charset="0"/>
+              </a:rPr>
+              <a:t> et afficher le message </a:t>
+            </a:r>
+            <a:r>
+              <a:rPr lang="fr-FR" b="1" dirty="0">
+                <a:latin typeface="Times New Roman" panose="02020603050405020304" pitchFamily="18" charset="0"/>
+                <a:cs typeface="Times New Roman" panose="02020603050405020304" pitchFamily="18" charset="0"/>
+              </a:rPr>
+              <a:t>Bonjour </a:t>
+            </a:r>
+            <a:r>
+              <a:rPr lang="fr-FR" b="1" dirty="0" err="1">
+                <a:latin typeface="Times New Roman" panose="02020603050405020304" pitchFamily="18" charset="0"/>
+                <a:cs typeface="Times New Roman" panose="02020603050405020304" pitchFamily="18" charset="0"/>
+              </a:rPr>
+              <a:t>nom_paramètre</a:t>
+            </a:r>
+            <a:r>
+              <a:rPr lang="fr-FR" b="1" dirty="0">
+                <a:latin typeface="Times New Roman" panose="02020603050405020304" pitchFamily="18" charset="0"/>
+                <a:cs typeface="Times New Roman" panose="02020603050405020304" pitchFamily="18" charset="0"/>
+              </a:rPr>
+              <a:t> !</a:t>
+            </a:r>
+            <a:endParaRPr lang="fr-FR" dirty="0">
+              <a:latin typeface="Times New Roman" panose="02020603050405020304" pitchFamily="18" charset="0"/>
+              <a:cs typeface="Times New Roman" panose="02020603050405020304" pitchFamily="18" charset="0"/>
+            </a:endParaRPr>
+          </a:p>
+        </p:txBody>
+      </p:sp>
       <p:pic>
         <p:nvPicPr>
-          <p:cNvPr id="9" name="Image 8">
+          <p:cNvPr id="7" name="Image 6">
             <a:extLst>
               <a:ext uri="{FF2B5EF4-FFF2-40B4-BE49-F238E27FC236}">
-                <a16:creationId xmlns:a16="http://schemas.microsoft.com/office/drawing/2014/main" id="{4286593D-00D0-626D-7996-1E5BA50EECD0}"/>
+                <a16:creationId xmlns:a16="http://schemas.microsoft.com/office/drawing/2014/main" id="{335DF13C-F77B-F769-D76D-2D2B572ED6F6}"/>
               </a:ext>
             </a:extLst>
           </p:cNvPr>
@@ -8261,104 +8641,20 @@
         </p:blipFill>
         <p:spPr>
           <a:xfrm>
-            <a:off x="3466769" y="1590029"/>
-            <a:ext cx="4169714" cy="1692235"/>
+            <a:off x="3555501" y="1388078"/>
+            <a:ext cx="3945888" cy="1826613"/>
           </a:xfrm>
           <a:prstGeom prst="rect">
             <a:avLst/>
           </a:prstGeom>
         </p:spPr>
       </p:pic>
-      <p:sp>
-        <p:nvSpPr>
-          <p:cNvPr id="12" name="ZoneTexte 11">
+      <p:pic>
+        <p:nvPicPr>
+          <p:cNvPr id="10" name="Image 9">
             <a:extLst>
               <a:ext uri="{FF2B5EF4-FFF2-40B4-BE49-F238E27FC236}">
-                <a16:creationId xmlns:a16="http://schemas.microsoft.com/office/drawing/2014/main" id="{E0336AEF-7FCA-1E66-4B7F-7E9EC9530BBA}"/>
-              </a:ext>
-            </a:extLst>
-          </p:cNvPr>
-          <p:cNvSpPr txBox="1"/>
-          <p:nvPr/>
-        </p:nvSpPr>
-        <p:spPr>
-          <a:xfrm>
-            <a:off x="227446" y="3305280"/>
-            <a:ext cx="11178450" cy="707886"/>
-          </a:xfrm>
-          <a:prstGeom prst="rect">
-            <a:avLst/>
-          </a:prstGeom>
-          <a:noFill/>
-        </p:spPr>
-        <p:txBody>
-          <a:bodyPr wrap="square" rtlCol="0">
-            <a:spAutoFit/>
-          </a:bodyPr>
-          <a:lstStyle>
-            <a:defPPr>
-              <a:defRPr lang="en-US"/>
-            </a:defPPr>
-            <a:lvl1pPr>
-              <a:defRPr sz="2000"/>
-            </a:lvl1pPr>
-          </a:lstStyle>
-          <a:p>
-            <a:r>
-              <a:rPr lang="fr-FR" dirty="0">
-                <a:latin typeface="Times New Roman" panose="02020603050405020304" pitchFamily="18" charset="0"/>
-                <a:cs typeface="Times New Roman" panose="02020603050405020304" pitchFamily="18" charset="0"/>
-              </a:rPr>
-              <a:t>Modifions la fonction pour prendre un paramètre chaine de caractères appelé </a:t>
-            </a:r>
-            <a:r>
-              <a:rPr lang="fr-FR" b="1" dirty="0">
-                <a:latin typeface="Times New Roman" panose="02020603050405020304" pitchFamily="18" charset="0"/>
-                <a:cs typeface="Times New Roman" panose="02020603050405020304" pitchFamily="18" charset="0"/>
-              </a:rPr>
-              <a:t>nom</a:t>
-            </a:r>
-            <a:r>
-              <a:rPr lang="fr-FR" dirty="0">
-                <a:latin typeface="Times New Roman" panose="02020603050405020304" pitchFamily="18" charset="0"/>
-                <a:cs typeface="Times New Roman" panose="02020603050405020304" pitchFamily="18" charset="0"/>
-              </a:rPr>
-              <a:t> et afficher le message </a:t>
-            </a:r>
-            <a:r>
-              <a:rPr lang="fr-FR" b="1" dirty="0">
-                <a:latin typeface="Times New Roman" panose="02020603050405020304" pitchFamily="18" charset="0"/>
-                <a:cs typeface="Times New Roman" panose="02020603050405020304" pitchFamily="18" charset="0"/>
-              </a:rPr>
-              <a:t>Bonjour </a:t>
-            </a:r>
-            <a:r>
-              <a:rPr lang="fr-FR" b="1" dirty="0" err="1">
-                <a:latin typeface="Times New Roman" panose="02020603050405020304" pitchFamily="18" charset="0"/>
-                <a:cs typeface="Times New Roman" panose="02020603050405020304" pitchFamily="18" charset="0"/>
-              </a:rPr>
-              <a:t>nom_paramètre</a:t>
-            </a:r>
-            <a:r>
-              <a:rPr lang="fr-FR" b="1" dirty="0">
-                <a:latin typeface="Times New Roman" panose="02020603050405020304" pitchFamily="18" charset="0"/>
-                <a:cs typeface="Times New Roman" panose="02020603050405020304" pitchFamily="18" charset="0"/>
-              </a:rPr>
-              <a:t> !</a:t>
-            </a:r>
-            <a:endParaRPr lang="fr-FR" dirty="0">
-              <a:latin typeface="Times New Roman" panose="02020603050405020304" pitchFamily="18" charset="0"/>
-              <a:cs typeface="Times New Roman" panose="02020603050405020304" pitchFamily="18" charset="0"/>
-            </a:endParaRPr>
-          </a:p>
-        </p:txBody>
-      </p:sp>
-      <p:pic>
-        <p:nvPicPr>
-          <p:cNvPr id="14" name="Image 13">
-            <a:extLst>
-              <a:ext uri="{FF2B5EF4-FFF2-40B4-BE49-F238E27FC236}">
-                <a16:creationId xmlns:a16="http://schemas.microsoft.com/office/drawing/2014/main" id="{8E35E423-12EB-1B4F-28EF-B4BDC0ADAF21}"/>
+                <a16:creationId xmlns:a16="http://schemas.microsoft.com/office/drawing/2014/main" id="{937F6479-366A-09D3-A69F-488842581D68}"/>
               </a:ext>
             </a:extLst>
           </p:cNvPr>
@@ -8375,8 +8671,8 @@
         </p:blipFill>
         <p:spPr>
           <a:xfrm>
-            <a:off x="3466769" y="4013166"/>
-            <a:ext cx="4531852" cy="2035192"/>
+            <a:off x="3466769" y="3973347"/>
+            <a:ext cx="4608922" cy="1959221"/>
           </a:xfrm>
           <a:prstGeom prst="rect">
             <a:avLst/>
@@ -8645,12 +8941,57 @@
           </a:p>
         </p:txBody>
       </p:sp>
+      <p:sp>
+        <p:nvSpPr>
+          <p:cNvPr id="9" name="ZoneTexte 8">
+            <a:extLst>
+              <a:ext uri="{FF2B5EF4-FFF2-40B4-BE49-F238E27FC236}">
+                <a16:creationId xmlns:a16="http://schemas.microsoft.com/office/drawing/2014/main" id="{60A8609C-2B4F-53A9-E8A9-0A8CF4B8859C}"/>
+              </a:ext>
+            </a:extLst>
+          </p:cNvPr>
+          <p:cNvSpPr txBox="1"/>
+          <p:nvPr/>
+        </p:nvSpPr>
+        <p:spPr>
+          <a:xfrm>
+            <a:off x="397565" y="4166198"/>
+            <a:ext cx="11178450" cy="400110"/>
+          </a:xfrm>
+          <a:prstGeom prst="rect">
+            <a:avLst/>
+          </a:prstGeom>
+          <a:noFill/>
+        </p:spPr>
+        <p:txBody>
+          <a:bodyPr wrap="square" rtlCol="0">
+            <a:spAutoFit/>
+          </a:bodyPr>
+          <a:lstStyle>
+            <a:defPPr>
+              <a:defRPr lang="en-US"/>
+            </a:defPPr>
+            <a:lvl1pPr>
+              <a:defRPr sz="2000"/>
+            </a:lvl1pPr>
+          </a:lstStyle>
+          <a:p>
+            <a:r>
+              <a:rPr lang="fr-FR" dirty="0">
+                <a:latin typeface="Times New Roman" panose="02020603050405020304" pitchFamily="18" charset="0"/>
+                <a:cs typeface="Times New Roman" panose="02020603050405020304" pitchFamily="18" charset="0"/>
+              </a:rPr>
+              <a:t>Si on veut appeler les paramètres en désordre il faut préciser le nom lorsqu’on appelle de la fonction.</a:t>
+            </a:r>
+          </a:p>
+        </p:txBody>
+      </p:sp>
       <p:pic>
         <p:nvPicPr>
-          <p:cNvPr id="8" name="Image 7">
+          <p:cNvPr id="10" name="Image 9">
             <a:extLst>
               <a:ext uri="{FF2B5EF4-FFF2-40B4-BE49-F238E27FC236}">
-                <a16:creationId xmlns:a16="http://schemas.microsoft.com/office/drawing/2014/main" id="{4A8E6581-F7C4-F8ED-7F5B-C931CB61E5A4}"/>
+                <a16:creationId xmlns:a16="http://schemas.microsoft.com/office/drawing/2014/main" id="{6E4C53E9-04F2-EAC1-DDF9-4F94F9A58D24}"/>
               </a:ext>
             </a:extLst>
           </p:cNvPr>
@@ -8667,65 +9008,20 @@
         </p:blipFill>
         <p:spPr>
           <a:xfrm>
-            <a:off x="3113605" y="2358595"/>
-            <a:ext cx="4925085" cy="1756635"/>
+            <a:off x="2990466" y="2350091"/>
+            <a:ext cx="5401193" cy="1898713"/>
           </a:xfrm>
           <a:prstGeom prst="rect">
             <a:avLst/>
           </a:prstGeom>
         </p:spPr>
       </p:pic>
-      <p:sp>
-        <p:nvSpPr>
-          <p:cNvPr id="9" name="ZoneTexte 8">
+      <p:pic>
+        <p:nvPicPr>
+          <p:cNvPr id="14" name="Image 13">
             <a:extLst>
               <a:ext uri="{FF2B5EF4-FFF2-40B4-BE49-F238E27FC236}">
-                <a16:creationId xmlns:a16="http://schemas.microsoft.com/office/drawing/2014/main" id="{60A8609C-2B4F-53A9-E8A9-0A8CF4B8859C}"/>
-              </a:ext>
-            </a:extLst>
-          </p:cNvPr>
-          <p:cNvSpPr txBox="1"/>
-          <p:nvPr/>
-        </p:nvSpPr>
-        <p:spPr>
-          <a:xfrm>
-            <a:off x="397565" y="4166198"/>
-            <a:ext cx="11178450" cy="400110"/>
-          </a:xfrm>
-          <a:prstGeom prst="rect">
-            <a:avLst/>
-          </a:prstGeom>
-          <a:noFill/>
-        </p:spPr>
-        <p:txBody>
-          <a:bodyPr wrap="square" rtlCol="0">
-            <a:spAutoFit/>
-          </a:bodyPr>
-          <a:lstStyle>
-            <a:defPPr>
-              <a:defRPr lang="en-US"/>
-            </a:defPPr>
-            <a:lvl1pPr>
-              <a:defRPr sz="2000"/>
-            </a:lvl1pPr>
-          </a:lstStyle>
-          <a:p>
-            <a:r>
-              <a:rPr lang="fr-FR" dirty="0">
-                <a:latin typeface="Times New Roman" panose="02020603050405020304" pitchFamily="18" charset="0"/>
-                <a:cs typeface="Times New Roman" panose="02020603050405020304" pitchFamily="18" charset="0"/>
-              </a:rPr>
-              <a:t>Si on veut appeler les paramètres en désordre il faut préciser le nom lorsqu’on appelle de la fonction.</a:t>
-            </a:r>
-          </a:p>
-        </p:txBody>
-      </p:sp>
-      <p:pic>
-        <p:nvPicPr>
-          <p:cNvPr id="12" name="Image 11">
-            <a:extLst>
-              <a:ext uri="{FF2B5EF4-FFF2-40B4-BE49-F238E27FC236}">
-                <a16:creationId xmlns:a16="http://schemas.microsoft.com/office/drawing/2014/main" id="{8808253D-58D7-51CE-3190-AFA5B8F1A787}"/>
+                <a16:creationId xmlns:a16="http://schemas.microsoft.com/office/drawing/2014/main" id="{C89D46CC-FEDD-815C-C38D-C2092934AC02}"/>
               </a:ext>
             </a:extLst>
           </p:cNvPr>
@@ -8742,8 +9038,8 @@
         </p:blipFill>
         <p:spPr>
           <a:xfrm>
-            <a:off x="3113605" y="4643946"/>
-            <a:ext cx="4924411" cy="1592262"/>
+            <a:off x="2932656" y="4519116"/>
+            <a:ext cx="5459003" cy="1698804"/>
           </a:xfrm>
           <a:prstGeom prst="rect">
             <a:avLst/>
@@ -8971,36 +9267,6 @@
           </a:fontRef>
         </p:style>
       </p:cxnSp>
-      <p:pic>
-        <p:nvPicPr>
-          <p:cNvPr id="7" name="Image 6">
-            <a:extLst>
-              <a:ext uri="{FF2B5EF4-FFF2-40B4-BE49-F238E27FC236}">
-                <a16:creationId xmlns:a16="http://schemas.microsoft.com/office/drawing/2014/main" id="{123F22D3-CA8A-C400-B9B3-92CE6E326CBA}"/>
-              </a:ext>
-            </a:extLst>
-          </p:cNvPr>
-          <p:cNvPicPr>
-            <a:picLocks noChangeAspect="1"/>
-          </p:cNvPicPr>
-          <p:nvPr/>
-        </p:nvPicPr>
-        <p:blipFill>
-          <a:blip r:embed="rId2"/>
-          <a:stretch>
-            <a:fillRect/>
-          </a:stretch>
-        </p:blipFill>
-        <p:spPr>
-          <a:xfrm>
-            <a:off x="792873" y="1955181"/>
-            <a:ext cx="4593937" cy="2042805"/>
-          </a:xfrm>
-          <a:prstGeom prst="rect">
-            <a:avLst/>
-          </a:prstGeom>
-        </p:spPr>
-      </p:pic>
       <p:sp>
         <p:nvSpPr>
           <p:cNvPr id="8" name="ZoneTexte 7">
@@ -9015,7 +9281,7 @@
         </p:nvSpPr>
         <p:spPr>
           <a:xfrm>
-            <a:off x="500932" y="4358765"/>
+            <a:off x="500932" y="4190090"/>
             <a:ext cx="11178450" cy="707886"/>
           </a:xfrm>
           <a:prstGeom prst="rect">
@@ -9046,36 +9312,6 @@
           </a:p>
         </p:txBody>
       </p:sp>
-      <p:pic>
-        <p:nvPicPr>
-          <p:cNvPr id="10" name="Image 9">
-            <a:extLst>
-              <a:ext uri="{FF2B5EF4-FFF2-40B4-BE49-F238E27FC236}">
-                <a16:creationId xmlns:a16="http://schemas.microsoft.com/office/drawing/2014/main" id="{27C612EC-254B-0FB5-C8D6-1A7635EF5C62}"/>
-              </a:ext>
-            </a:extLst>
-          </p:cNvPr>
-          <p:cNvPicPr>
-            <a:picLocks noChangeAspect="1"/>
-          </p:cNvPicPr>
-          <p:nvPr/>
-        </p:nvPicPr>
-        <p:blipFill>
-          <a:blip r:embed="rId3"/>
-          <a:stretch>
-            <a:fillRect/>
-          </a:stretch>
-        </p:blipFill>
-        <p:spPr>
-          <a:xfrm>
-            <a:off x="6483221" y="1955181"/>
-            <a:ext cx="4710682" cy="2177584"/>
-          </a:xfrm>
-          <a:prstGeom prst="rect">
-            <a:avLst/>
-          </a:prstGeom>
-        </p:spPr>
-      </p:pic>
       <p:pic>
         <p:nvPicPr>
           <p:cNvPr id="13" name="Image 12">
@@ -9091,6 +9327,66 @@
           <p:nvPr/>
         </p:nvPicPr>
         <p:blipFill>
+          <a:blip r:embed="rId2"/>
+          <a:stretch>
+            <a:fillRect/>
+          </a:stretch>
+        </p:blipFill>
+        <p:spPr>
+          <a:xfrm>
+            <a:off x="3395051" y="5193361"/>
+            <a:ext cx="3849800" cy="897849"/>
+          </a:xfrm>
+          <a:prstGeom prst="rect">
+            <a:avLst/>
+          </a:prstGeom>
+        </p:spPr>
+      </p:pic>
+      <p:pic>
+        <p:nvPicPr>
+          <p:cNvPr id="9" name="Image 8">
+            <a:extLst>
+              <a:ext uri="{FF2B5EF4-FFF2-40B4-BE49-F238E27FC236}">
+                <a16:creationId xmlns:a16="http://schemas.microsoft.com/office/drawing/2014/main" id="{3900F89A-AD78-6696-8C65-CE39A3AD73F5}"/>
+              </a:ext>
+            </a:extLst>
+          </p:cNvPr>
+          <p:cNvPicPr>
+            <a:picLocks noChangeAspect="1"/>
+          </p:cNvPicPr>
+          <p:nvPr/>
+        </p:nvPicPr>
+        <p:blipFill>
+          <a:blip r:embed="rId3"/>
+          <a:stretch>
+            <a:fillRect/>
+          </a:stretch>
+        </p:blipFill>
+        <p:spPr>
+          <a:xfrm>
+            <a:off x="723700" y="1952228"/>
+            <a:ext cx="4400347" cy="2177584"/>
+          </a:xfrm>
+          <a:prstGeom prst="rect">
+            <a:avLst/>
+          </a:prstGeom>
+        </p:spPr>
+      </p:pic>
+      <p:pic>
+        <p:nvPicPr>
+          <p:cNvPr id="14" name="Image 13">
+            <a:extLst>
+              <a:ext uri="{FF2B5EF4-FFF2-40B4-BE49-F238E27FC236}">
+                <a16:creationId xmlns:a16="http://schemas.microsoft.com/office/drawing/2014/main" id="{CA68ED7D-4685-4BD3-77C2-B9A1BD4E7A60}"/>
+              </a:ext>
+            </a:extLst>
+          </p:cNvPr>
+          <p:cNvPicPr>
+            <a:picLocks noChangeAspect="1"/>
+          </p:cNvPicPr>
+          <p:nvPr/>
+        </p:nvPicPr>
+        <p:blipFill>
           <a:blip r:embed="rId4"/>
           <a:stretch>
             <a:fillRect/>
@@ -9098,8 +9394,8 @@
         </p:blipFill>
         <p:spPr>
           <a:xfrm>
-            <a:off x="3395051" y="5193361"/>
-            <a:ext cx="3849800" cy="897849"/>
+            <a:off x="6382427" y="1950606"/>
+            <a:ext cx="4534293" cy="2105346"/>
           </a:xfrm>
           <a:prstGeom prst="rect">
             <a:avLst/>
@@ -9831,8 +10127,8 @@
         </p:blipFill>
         <p:spPr>
           <a:xfrm>
-            <a:off x="1337650" y="1488942"/>
-            <a:ext cx="8639269" cy="3282347"/>
+            <a:off x="500932" y="1488942"/>
+            <a:ext cx="11178450" cy="3282347"/>
           </a:xfrm>
           <a:prstGeom prst="rect">
             <a:avLst/>

</xml_diff>

<commit_message>
feat(chp5): rédaction fonction lambda
Ajout de la section sur les fonctions lambda
</commit_message>
<xml_diff>
--- a/source/Chapitre 5 - Les fonctions.pptx
+++ b/source/Chapitre 5 - Les fonctions.pptx
@@ -131,7 +131,7 @@
 <file path=ppt/revisionInfo.xml><?xml version="1.0" encoding="utf-8"?>
 <p1510:revInfo xmlns:a="http://schemas.openxmlformats.org/drawingml/2006/main" xmlns:r="http://schemas.openxmlformats.org/officeDocument/2006/relationships" xmlns:p1510="http://schemas.microsoft.com/office/powerpoint/2015/10/main">
   <p1510:revLst>
-    <p1510:client id="{E7E317F0-1E26-4BB4-BF77-FD59F7E1022E}" v="3" dt="2023-09-23T09:29:11.690"/>
+    <p1510:client id="{E7E317F0-1E26-4BB4-BF77-FD59F7E1022E}" v="8" dt="2023-09-23T09:51:04.677"/>
   </p1510:revLst>
 </p1510:revInfo>
 </file>
@@ -999,10 +999,25 @@
   <pc:docChgLst>
     <pc:chgData name="Ismaël Tuo" userId="fca7baf0e513a1e6" providerId="LiveId" clId="{E7E317F0-1E26-4BB4-BF77-FD59F7E1022E}"/>
     <pc:docChg chg="undo custSel modSld">
-      <pc:chgData name="Ismaël Tuo" userId="fca7baf0e513a1e6" providerId="LiveId" clId="{E7E317F0-1E26-4BB4-BF77-FD59F7E1022E}" dt="2023-09-23T09:36:08.017" v="84" actId="1076"/>
+      <pc:chgData name="Ismaël Tuo" userId="fca7baf0e513a1e6" providerId="LiveId" clId="{E7E317F0-1E26-4BB4-BF77-FD59F7E1022E}" dt="2023-09-23T09:51:17.077" v="894" actId="20577"/>
       <pc:docMkLst>
         <pc:docMk/>
       </pc:docMkLst>
+      <pc:sldChg chg="modSp mod">
+        <pc:chgData name="Ismaël Tuo" userId="fca7baf0e513a1e6" providerId="LiveId" clId="{E7E317F0-1E26-4BB4-BF77-FD59F7E1022E}" dt="2023-09-23T09:51:17.077" v="894" actId="20577"/>
+        <pc:sldMkLst>
+          <pc:docMk/>
+          <pc:sldMk cId="1268069196" sldId="285"/>
+        </pc:sldMkLst>
+        <pc:spChg chg="mod">
+          <ac:chgData name="Ismaël Tuo" userId="fca7baf0e513a1e6" providerId="LiveId" clId="{E7E317F0-1E26-4BB4-BF77-FD59F7E1022E}" dt="2023-09-23T09:51:17.077" v="894" actId="20577"/>
+          <ac:spMkLst>
+            <pc:docMk/>
+            <pc:sldMk cId="1268069196" sldId="285"/>
+            <ac:spMk id="11" creationId="{C27A3656-3CB0-8161-AE9F-B92FBE4F5083}"/>
+          </ac:spMkLst>
+        </pc:spChg>
+      </pc:sldChg>
       <pc:sldChg chg="modSp mod">
         <pc:chgData name="Ismaël Tuo" userId="fca7baf0e513a1e6" providerId="LiveId" clId="{E7E317F0-1E26-4BB4-BF77-FD59F7E1022E}" dt="2023-09-23T08:58:31.589" v="8" actId="20577"/>
         <pc:sldMkLst>
@@ -1187,6 +1202,61 @@
             <pc:docMk/>
             <pc:sldMk cId="389737552" sldId="292"/>
             <ac:picMk id="10" creationId="{D32AF948-C73D-6452-217B-DDC1ABE14D0A}"/>
+          </ac:picMkLst>
+        </pc:picChg>
+      </pc:sldChg>
+      <pc:sldChg chg="addSp delSp modSp mod">
+        <pc:chgData name="Ismaël Tuo" userId="fca7baf0e513a1e6" providerId="LiveId" clId="{E7E317F0-1E26-4BB4-BF77-FD59F7E1022E}" dt="2023-09-23T09:50:17.867" v="887" actId="14100"/>
+        <pc:sldMkLst>
+          <pc:docMk/>
+          <pc:sldMk cId="1103931565" sldId="293"/>
+        </pc:sldMkLst>
+        <pc:spChg chg="add mod">
+          <ac:chgData name="Ismaël Tuo" userId="fca7baf0e513a1e6" providerId="LiveId" clId="{E7E317F0-1E26-4BB4-BF77-FD59F7E1022E}" dt="2023-09-23T09:50:17.867" v="887" actId="14100"/>
+          <ac:spMkLst>
+            <pc:docMk/>
+            <pc:sldMk cId="1103931565" sldId="293"/>
+            <ac:spMk id="2" creationId="{9281E0DF-CE6E-D51A-59F4-974E77B096E1}"/>
+          </ac:spMkLst>
+        </pc:spChg>
+        <pc:spChg chg="add mod">
+          <ac:chgData name="Ismaël Tuo" userId="fca7baf0e513a1e6" providerId="LiveId" clId="{E7E317F0-1E26-4BB4-BF77-FD59F7E1022E}" dt="2023-09-23T09:50:13.218" v="885" actId="1076"/>
+          <ac:spMkLst>
+            <pc:docMk/>
+            <pc:sldMk cId="1103931565" sldId="293"/>
+            <ac:spMk id="7" creationId="{812C31AA-4AFD-DFD8-7361-EC5B597B0FC0}"/>
+          </ac:spMkLst>
+        </pc:spChg>
+        <pc:spChg chg="mod">
+          <ac:chgData name="Ismaël Tuo" userId="fca7baf0e513a1e6" providerId="LiveId" clId="{E7E317F0-1E26-4BB4-BF77-FD59F7E1022E}" dt="2023-09-23T09:41:58.084" v="373" actId="20577"/>
+          <ac:spMkLst>
+            <pc:docMk/>
+            <pc:sldMk cId="1103931565" sldId="293"/>
+            <ac:spMk id="11" creationId="{C27A3656-3CB0-8161-AE9F-B92FBE4F5083}"/>
+          </ac:spMkLst>
+        </pc:spChg>
+        <pc:spChg chg="add mod">
+          <ac:chgData name="Ismaël Tuo" userId="fca7baf0e513a1e6" providerId="LiveId" clId="{E7E317F0-1E26-4BB4-BF77-FD59F7E1022E}" dt="2023-09-23T09:50:08.123" v="883" actId="1076"/>
+          <ac:spMkLst>
+            <pc:docMk/>
+            <pc:sldMk cId="1103931565" sldId="293"/>
+            <ac:spMk id="13" creationId="{4F17111F-78BC-2107-B256-BA1BC0E46BA8}"/>
+          </ac:spMkLst>
+        </pc:spChg>
+        <pc:picChg chg="add del mod">
+          <ac:chgData name="Ismaël Tuo" userId="fca7baf0e513a1e6" providerId="LiveId" clId="{E7E317F0-1E26-4BB4-BF77-FD59F7E1022E}" dt="2023-09-23T09:48:01.731" v="710" actId="478"/>
+          <ac:picMkLst>
+            <pc:docMk/>
+            <pc:sldMk cId="1103931565" sldId="293"/>
+            <ac:picMk id="9" creationId="{36976BDF-329C-A056-27C6-AB8F9B1114EE}"/>
+          </ac:picMkLst>
+        </pc:picChg>
+        <pc:picChg chg="add mod">
+          <ac:chgData name="Ismaël Tuo" userId="fca7baf0e513a1e6" providerId="LiveId" clId="{E7E317F0-1E26-4BB4-BF77-FD59F7E1022E}" dt="2023-09-23T09:50:10.891" v="884" actId="1076"/>
+          <ac:picMkLst>
+            <pc:docMk/>
+            <pc:sldMk cId="1103931565" sldId="293"/>
+            <ac:picMk id="12" creationId="{99A0B1B9-3E8F-4343-7461-53C4955CCFEC}"/>
           </ac:picMkLst>
         </pc:picChg>
       </pc:sldChg>
@@ -6101,7 +6171,7 @@
         <p:spPr>
           <a:xfrm>
             <a:off x="419077" y="859127"/>
-            <a:ext cx="11178450" cy="400110"/>
+            <a:ext cx="11178450" cy="707886"/>
           </a:xfrm>
           <a:prstGeom prst="rect">
             <a:avLst/>
@@ -6126,35 +6196,35 @@
                 <a:latin typeface="Times New Roman" panose="02020603050405020304" pitchFamily="18" charset="0"/>
                 <a:cs typeface="Times New Roman" panose="02020603050405020304" pitchFamily="18" charset="0"/>
               </a:rPr>
-              <a:t>Une fonction en Python s’écrit dans un fichier </a:t>
+              <a:t>Le mot clé </a:t>
             </a:r>
             <a:r>
               <a:rPr lang="fr-FR" b="1" dirty="0">
                 <a:latin typeface="Times New Roman" panose="02020603050405020304" pitchFamily="18" charset="0"/>
                 <a:cs typeface="Times New Roman" panose="02020603050405020304" pitchFamily="18" charset="0"/>
               </a:rPr>
-              <a:t>.</a:t>
-            </a:r>
-            <a:r>
-              <a:rPr lang="fr-FR" b="1" dirty="0" err="1">
-                <a:latin typeface="Times New Roman" panose="02020603050405020304" pitchFamily="18" charset="0"/>
-                <a:cs typeface="Times New Roman" panose="02020603050405020304" pitchFamily="18" charset="0"/>
-              </a:rPr>
-              <a:t>py</a:t>
+              <a:t>lambda </a:t>
+            </a:r>
+            <a:r>
+              <a:rPr lang="fr-FR" dirty="0">
+                <a:latin typeface="Times New Roman" panose="02020603050405020304" pitchFamily="18" charset="0"/>
+                <a:cs typeface="Times New Roman" panose="02020603050405020304" pitchFamily="18" charset="0"/>
+              </a:rPr>
+              <a:t>permet de créer des fonctions extrêmement courtes. Pour utiliser </a:t>
             </a:r>
             <a:r>
               <a:rPr lang="fr-FR" b="1" dirty="0">
                 <a:latin typeface="Times New Roman" panose="02020603050405020304" pitchFamily="18" charset="0"/>
                 <a:cs typeface="Times New Roman" panose="02020603050405020304" pitchFamily="18" charset="0"/>
               </a:rPr>
-              <a:t> </a:t>
+              <a:t>lambda, </a:t>
             </a:r>
             <a:r>
               <a:rPr lang="fr-FR" dirty="0">
                 <a:latin typeface="Times New Roman" panose="02020603050405020304" pitchFamily="18" charset="0"/>
                 <a:cs typeface="Times New Roman" panose="02020603050405020304" pitchFamily="18" charset="0"/>
               </a:rPr>
-              <a:t>avec la syntaxe suivante:</a:t>
+              <a:t>il faut utiliser la syntaxe suivante:</a:t>
             </a:r>
           </a:p>
         </p:txBody>
@@ -6198,6 +6268,248 @@
           </a:fontRef>
         </p:style>
       </p:cxnSp>
+      <p:sp>
+        <p:nvSpPr>
+          <p:cNvPr id="2" name="ZoneTexte 1">
+            <a:extLst>
+              <a:ext uri="{FF2B5EF4-FFF2-40B4-BE49-F238E27FC236}">
+                <a16:creationId xmlns:a16="http://schemas.microsoft.com/office/drawing/2014/main" id="{9281E0DF-CE6E-D51A-59F4-974E77B096E1}"/>
+              </a:ext>
+            </a:extLst>
+          </p:cNvPr>
+          <p:cNvSpPr txBox="1"/>
+          <p:nvPr/>
+        </p:nvSpPr>
+        <p:spPr>
+          <a:xfrm>
+            <a:off x="2923874" y="1643399"/>
+            <a:ext cx="5043175" cy="400110"/>
+          </a:xfrm>
+          <a:prstGeom prst="rect">
+            <a:avLst/>
+          </a:prstGeom>
+          <a:noFill/>
+        </p:spPr>
+        <p:txBody>
+          <a:bodyPr wrap="square" rtlCol="0">
+            <a:spAutoFit/>
+          </a:bodyPr>
+          <a:lstStyle>
+            <a:defPPr>
+              <a:defRPr lang="en-US"/>
+            </a:defPPr>
+            <a:lvl1pPr>
+              <a:defRPr sz="2000"/>
+            </a:lvl1pPr>
+          </a:lstStyle>
+          <a:p>
+            <a:r>
+              <a:rPr lang="fr-FR" b="1" i="1" dirty="0">
+                <a:latin typeface="Times New Roman" panose="02020603050405020304" pitchFamily="18" charset="0"/>
+                <a:cs typeface="Times New Roman" panose="02020603050405020304" pitchFamily="18" charset="0"/>
+              </a:rPr>
+              <a:t>lambda arg1, arg2,… : instruction de retour</a:t>
+            </a:r>
+          </a:p>
+        </p:txBody>
+      </p:sp>
+      <p:sp>
+        <p:nvSpPr>
+          <p:cNvPr id="7" name="ZoneTexte 6">
+            <a:extLst>
+              <a:ext uri="{FF2B5EF4-FFF2-40B4-BE49-F238E27FC236}">
+                <a16:creationId xmlns:a16="http://schemas.microsoft.com/office/drawing/2014/main" id="{812C31AA-4AFD-DFD8-7361-EC5B597B0FC0}"/>
+              </a:ext>
+            </a:extLst>
+          </p:cNvPr>
+          <p:cNvSpPr txBox="1"/>
+          <p:nvPr/>
+        </p:nvSpPr>
+        <p:spPr>
+          <a:xfrm>
+            <a:off x="419077" y="2043509"/>
+            <a:ext cx="11178450" cy="707886"/>
+          </a:xfrm>
+          <a:prstGeom prst="rect">
+            <a:avLst/>
+          </a:prstGeom>
+          <a:noFill/>
+        </p:spPr>
+        <p:txBody>
+          <a:bodyPr wrap="square" rtlCol="0">
+            <a:spAutoFit/>
+          </a:bodyPr>
+          <a:lstStyle>
+            <a:defPPr>
+              <a:defRPr lang="en-US"/>
+            </a:defPPr>
+            <a:lvl1pPr>
+              <a:defRPr sz="2000"/>
+            </a:lvl1pPr>
+          </a:lstStyle>
+          <a:p>
+            <a:r>
+              <a:rPr lang="fr-FR" dirty="0">
+                <a:latin typeface="Times New Roman" panose="02020603050405020304" pitchFamily="18" charset="0"/>
+                <a:cs typeface="Times New Roman" panose="02020603050405020304" pitchFamily="18" charset="0"/>
+              </a:rPr>
+              <a:t>La fonction </a:t>
+            </a:r>
+            <a:r>
+              <a:rPr lang="fr-FR" b="1" dirty="0">
+                <a:latin typeface="Times New Roman" panose="02020603050405020304" pitchFamily="18" charset="0"/>
+                <a:cs typeface="Times New Roman" panose="02020603050405020304" pitchFamily="18" charset="0"/>
+              </a:rPr>
+              <a:t>lambda </a:t>
+            </a:r>
+            <a:r>
+              <a:rPr lang="fr-FR" dirty="0">
+                <a:latin typeface="Times New Roman" panose="02020603050405020304" pitchFamily="18" charset="0"/>
+                <a:cs typeface="Times New Roman" panose="02020603050405020304" pitchFamily="18" charset="0"/>
+              </a:rPr>
+              <a:t>doit être assignée à une variable on parle de </a:t>
+            </a:r>
+            <a:r>
+              <a:rPr lang="fr-FR" b="1" dirty="0">
+                <a:latin typeface="Times New Roman" panose="02020603050405020304" pitchFamily="18" charset="0"/>
+                <a:cs typeface="Times New Roman" panose="02020603050405020304" pitchFamily="18" charset="0"/>
+              </a:rPr>
+              <a:t>fonction anonyme </a:t>
+            </a:r>
+            <a:r>
+              <a:rPr lang="fr-FR" dirty="0">
+                <a:latin typeface="Times New Roman" panose="02020603050405020304" pitchFamily="18" charset="0"/>
+                <a:cs typeface="Times New Roman" panose="02020603050405020304" pitchFamily="18" charset="0"/>
+              </a:rPr>
+              <a:t>car on stocke ici une fonction dans une variable sans la définir avec le mot clé </a:t>
+            </a:r>
+            <a:r>
+              <a:rPr lang="fr-FR" b="1" dirty="0" err="1">
+                <a:latin typeface="Times New Roman" panose="02020603050405020304" pitchFamily="18" charset="0"/>
+                <a:cs typeface="Times New Roman" panose="02020603050405020304" pitchFamily="18" charset="0"/>
+              </a:rPr>
+              <a:t>def</a:t>
+            </a:r>
+            <a:r>
+              <a:rPr lang="fr-FR" dirty="0">
+                <a:latin typeface="Times New Roman" panose="02020603050405020304" pitchFamily="18" charset="0"/>
+                <a:cs typeface="Times New Roman" panose="02020603050405020304" pitchFamily="18" charset="0"/>
+              </a:rPr>
+              <a:t>.</a:t>
+            </a:r>
+          </a:p>
+        </p:txBody>
+      </p:sp>
+      <p:pic>
+        <p:nvPicPr>
+          <p:cNvPr id="12" name="Image 11">
+            <a:extLst>
+              <a:ext uri="{FF2B5EF4-FFF2-40B4-BE49-F238E27FC236}">
+                <a16:creationId xmlns:a16="http://schemas.microsoft.com/office/drawing/2014/main" id="{99A0B1B9-3E8F-4343-7461-53C4955CCFEC}"/>
+              </a:ext>
+            </a:extLst>
+          </p:cNvPr>
+          <p:cNvPicPr>
+            <a:picLocks noChangeAspect="1"/>
+          </p:cNvPicPr>
+          <p:nvPr/>
+        </p:nvPicPr>
+        <p:blipFill>
+          <a:blip r:embed="rId2"/>
+          <a:stretch>
+            <a:fillRect/>
+          </a:stretch>
+        </p:blipFill>
+        <p:spPr>
+          <a:xfrm>
+            <a:off x="3476530" y="2913089"/>
+            <a:ext cx="4490519" cy="2361181"/>
+          </a:xfrm>
+          <a:prstGeom prst="rect">
+            <a:avLst/>
+          </a:prstGeom>
+        </p:spPr>
+      </p:pic>
+      <p:sp>
+        <p:nvSpPr>
+          <p:cNvPr id="13" name="ZoneTexte 12">
+            <a:extLst>
+              <a:ext uri="{FF2B5EF4-FFF2-40B4-BE49-F238E27FC236}">
+                <a16:creationId xmlns:a16="http://schemas.microsoft.com/office/drawing/2014/main" id="{4F17111F-78BC-2107-B256-BA1BC0E46BA8}"/>
+              </a:ext>
+            </a:extLst>
+          </p:cNvPr>
+          <p:cNvSpPr txBox="1"/>
+          <p:nvPr/>
+        </p:nvSpPr>
+        <p:spPr>
+          <a:xfrm>
+            <a:off x="419077" y="5300970"/>
+            <a:ext cx="11178450" cy="707886"/>
+          </a:xfrm>
+          <a:prstGeom prst="rect">
+            <a:avLst/>
+          </a:prstGeom>
+          <a:noFill/>
+        </p:spPr>
+        <p:txBody>
+          <a:bodyPr wrap="square" rtlCol="0">
+            <a:spAutoFit/>
+          </a:bodyPr>
+          <a:lstStyle>
+            <a:defPPr>
+              <a:defRPr lang="en-US"/>
+            </a:defPPr>
+            <a:lvl1pPr>
+              <a:defRPr sz="2000"/>
+            </a:lvl1pPr>
+          </a:lstStyle>
+          <a:p>
+            <a:r>
+              <a:rPr lang="fr-FR" dirty="0">
+                <a:latin typeface="Times New Roman" panose="02020603050405020304" pitchFamily="18" charset="0"/>
+                <a:cs typeface="Times New Roman" panose="02020603050405020304" pitchFamily="18" charset="0"/>
+              </a:rPr>
+              <a:t>Il faut préférer des fonctions </a:t>
+            </a:r>
+            <a:r>
+              <a:rPr lang="fr-FR" b="1" dirty="0">
+                <a:latin typeface="Times New Roman" panose="02020603050405020304" pitchFamily="18" charset="0"/>
+                <a:cs typeface="Times New Roman" panose="02020603050405020304" pitchFamily="18" charset="0"/>
+              </a:rPr>
+              <a:t>lambda </a:t>
+            </a:r>
+            <a:r>
+              <a:rPr lang="fr-FR" dirty="0">
+                <a:latin typeface="Times New Roman" panose="02020603050405020304" pitchFamily="18" charset="0"/>
+                <a:cs typeface="Times New Roman" panose="02020603050405020304" pitchFamily="18" charset="0"/>
+              </a:rPr>
+              <a:t>au lieu d’une fonction avec </a:t>
+            </a:r>
+            <a:r>
+              <a:rPr lang="fr-FR" b="1" dirty="0" err="1">
+                <a:latin typeface="Times New Roman" panose="02020603050405020304" pitchFamily="18" charset="0"/>
+                <a:cs typeface="Times New Roman" panose="02020603050405020304" pitchFamily="18" charset="0"/>
+              </a:rPr>
+              <a:t>def</a:t>
+            </a:r>
+            <a:r>
+              <a:rPr lang="fr-FR" b="1" dirty="0">
+                <a:latin typeface="Times New Roman" panose="02020603050405020304" pitchFamily="18" charset="0"/>
+                <a:cs typeface="Times New Roman" panose="02020603050405020304" pitchFamily="18" charset="0"/>
+              </a:rPr>
+              <a:t> </a:t>
+            </a:r>
+            <a:r>
+              <a:rPr lang="fr-FR" dirty="0">
+                <a:latin typeface="Times New Roman" panose="02020603050405020304" pitchFamily="18" charset="0"/>
+                <a:cs typeface="Times New Roman" panose="02020603050405020304" pitchFamily="18" charset="0"/>
+              </a:rPr>
+              <a:t>quand la fonction ne contient qu’une seule instruction. </a:t>
+            </a:r>
+          </a:p>
+        </p:txBody>
+      </p:sp>
     </p:spTree>
     <p:extLst>
       <p:ext uri="{BB962C8B-B14F-4D97-AF65-F5344CB8AC3E}">
@@ -6746,7 +7058,7 @@
         <p:spPr>
           <a:xfrm>
             <a:off x="500932" y="912418"/>
-            <a:ext cx="9192515" cy="3416320"/>
+            <a:ext cx="9192515" cy="4154984"/>
           </a:xfrm>
           <a:prstGeom prst="rect">
             <a:avLst/>
@@ -6897,6 +7209,34 @@
               </a:rPr>
               <a:t>L’instruction return</a:t>
             </a:r>
+            <a:endParaRPr lang="fr-FR" sz="2400" dirty="0">
+              <a:latin typeface="Times New Roman" panose="02020603050405020304" pitchFamily="18" charset="0"/>
+              <a:cs typeface="Times New Roman" panose="02020603050405020304" pitchFamily="18" charset="0"/>
+            </a:endParaRPr>
+          </a:p>
+          <a:p>
+            <a:pPr marL="342900" indent="-342900">
+              <a:buFont typeface="+mj-lt"/>
+              <a:buAutoNum type="arabicPeriod"/>
+            </a:pPr>
+            <a:r>
+              <a:rPr lang="fr-FR" sz="2400" dirty="0">
+                <a:latin typeface="Times New Roman" panose="02020603050405020304" pitchFamily="18" charset="0"/>
+                <a:cs typeface="Times New Roman" panose="02020603050405020304" pitchFamily="18" charset="0"/>
+                <a:hlinkClick r:id="rId10" action="ppaction://hlinksldjump"/>
+              </a:rPr>
+              <a:t>Les fonctions lambda</a:t>
+            </a:r>
+            <a:endParaRPr lang="fr-FR" sz="2400" dirty="0">
+              <a:latin typeface="Times New Roman" panose="02020603050405020304" pitchFamily="18" charset="0"/>
+              <a:cs typeface="Times New Roman" panose="02020603050405020304" pitchFamily="18" charset="0"/>
+            </a:endParaRPr>
+          </a:p>
+          <a:p>
+            <a:pPr marL="342900" indent="-342900">
+              <a:buFont typeface="+mj-lt"/>
+              <a:buAutoNum type="arabicPeriod"/>
+            </a:pPr>
             <a:endParaRPr lang="fr-FR" sz="2400" dirty="0">
               <a:latin typeface="Times New Roman" panose="02020603050405020304" pitchFamily="18" charset="0"/>
               <a:cs typeface="Times New Roman" panose="02020603050405020304" pitchFamily="18" charset="0"/>

</xml_diff>

<commit_message>
Feat(chp): Ajout des exercices sur les fonction
Rédaction de la partie exercice sur les fonctions et convertion en pdf
</commit_message>
<xml_diff>
--- a/source/Chapitre 5 - Les fonctions.pptx
+++ b/source/Chapitre 5 - Les fonctions.pptx
@@ -5,7 +5,7 @@
     <p:sldMasterId id="2147483804" r:id="rId1"/>
   </p:sldMasterIdLst>
   <p:notesMasterIdLst>
-    <p:notesMasterId r:id="rId16"/>
+    <p:notesMasterId r:id="rId18"/>
   </p:notesMasterIdLst>
   <p:sldIdLst>
     <p:sldId id="257" r:id="rId2"/>
@@ -21,7 +21,9 @@
     <p:sldId id="292" r:id="rId12"/>
     <p:sldId id="293" r:id="rId13"/>
     <p:sldId id="296" r:id="rId14"/>
-    <p:sldId id="284" r:id="rId15"/>
+    <p:sldId id="297" r:id="rId15"/>
+    <p:sldId id="298" r:id="rId16"/>
+    <p:sldId id="284" r:id="rId17"/>
   </p:sldIdLst>
   <p:sldSz cx="12192000" cy="6858000"/>
   <p:notesSz cx="6858000" cy="9144000"/>
@@ -131,7 +133,7 @@
 <file path=ppt/revisionInfo.xml><?xml version="1.0" encoding="utf-8"?>
 <p1510:revInfo xmlns:a="http://schemas.openxmlformats.org/drawingml/2006/main" xmlns:r="http://schemas.openxmlformats.org/officeDocument/2006/relationships" xmlns:p1510="http://schemas.microsoft.com/office/powerpoint/2015/10/main">
   <p1510:revLst>
-    <p1510:client id="{E7E317F0-1E26-4BB4-BF77-FD59F7E1022E}" v="8" dt="2023-09-23T09:51:04.677"/>
+    <p1510:client id="{E7E317F0-1E26-4BB4-BF77-FD59F7E1022E}" v="17" dt="2023-10-01T14:45:23.081"/>
   </p1510:revLst>
 </p1510:revInfo>
 </file>
@@ -998,19 +1000,19 @@
   </pc:docChgLst>
   <pc:docChgLst>
     <pc:chgData name="Ismaël Tuo" userId="fca7baf0e513a1e6" providerId="LiveId" clId="{E7E317F0-1E26-4BB4-BF77-FD59F7E1022E}"/>
-    <pc:docChg chg="undo custSel modSld">
-      <pc:chgData name="Ismaël Tuo" userId="fca7baf0e513a1e6" providerId="LiveId" clId="{E7E317F0-1E26-4BB4-BF77-FD59F7E1022E}" dt="2023-09-23T09:51:17.077" v="894" actId="20577"/>
+    <pc:docChg chg="undo custSel addSld modSld">
+      <pc:chgData name="Ismaël Tuo" userId="fca7baf0e513a1e6" providerId="LiveId" clId="{E7E317F0-1E26-4BB4-BF77-FD59F7E1022E}" dt="2023-10-01T15:04:15.424" v="4341" actId="1076"/>
       <pc:docMkLst>
         <pc:docMk/>
       </pc:docMkLst>
       <pc:sldChg chg="modSp mod">
-        <pc:chgData name="Ismaël Tuo" userId="fca7baf0e513a1e6" providerId="LiveId" clId="{E7E317F0-1E26-4BB4-BF77-FD59F7E1022E}" dt="2023-09-23T09:51:17.077" v="894" actId="20577"/>
+        <pc:chgData name="Ismaël Tuo" userId="fca7baf0e513a1e6" providerId="LiveId" clId="{E7E317F0-1E26-4BB4-BF77-FD59F7E1022E}" dt="2023-10-01T14:58:09.928" v="4339" actId="20577"/>
         <pc:sldMkLst>
           <pc:docMk/>
           <pc:sldMk cId="1268069196" sldId="285"/>
         </pc:sldMkLst>
         <pc:spChg chg="mod">
-          <ac:chgData name="Ismaël Tuo" userId="fca7baf0e513a1e6" providerId="LiveId" clId="{E7E317F0-1E26-4BB4-BF77-FD59F7E1022E}" dt="2023-09-23T09:51:17.077" v="894" actId="20577"/>
+          <ac:chgData name="Ismaël Tuo" userId="fca7baf0e513a1e6" providerId="LiveId" clId="{E7E317F0-1E26-4BB4-BF77-FD59F7E1022E}" dt="2023-10-01T14:58:09.928" v="4339" actId="20577"/>
           <ac:spMkLst>
             <pc:docMk/>
             <pc:sldMk cId="1268069196" sldId="285"/>
@@ -1019,7 +1021,7 @@
         </pc:spChg>
       </pc:sldChg>
       <pc:sldChg chg="modSp mod">
-        <pc:chgData name="Ismaël Tuo" userId="fca7baf0e513a1e6" providerId="LiveId" clId="{E7E317F0-1E26-4BB4-BF77-FD59F7E1022E}" dt="2023-09-23T08:58:31.589" v="8" actId="20577"/>
+        <pc:chgData name="Ismaël Tuo" userId="fca7baf0e513a1e6" providerId="LiveId" clId="{E7E317F0-1E26-4BB4-BF77-FD59F7E1022E}" dt="2023-10-01T14:51:34.137" v="4336" actId="20577"/>
         <pc:sldMkLst>
           <pc:docMk/>
           <pc:sldMk cId="2639441608" sldId="286"/>
@@ -1038,6 +1040,14 @@
             <pc:docMk/>
             <pc:sldMk cId="2639441608" sldId="286"/>
             <ac:spMk id="11" creationId="{C27A3656-3CB0-8161-AE9F-B92FBE4F5083}"/>
+          </ac:spMkLst>
+        </pc:spChg>
+        <pc:spChg chg="mod">
+          <ac:chgData name="Ismaël Tuo" userId="fca7baf0e513a1e6" providerId="LiveId" clId="{E7E317F0-1E26-4BB4-BF77-FD59F7E1022E}" dt="2023-10-01T14:51:34.137" v="4336" actId="20577"/>
+          <ac:spMkLst>
+            <pc:docMk/>
+            <pc:sldMk cId="2639441608" sldId="286"/>
+            <ac:spMk id="16" creationId="{E2430057-B291-8353-0A3D-1597D2BD64B3}"/>
           </ac:spMkLst>
         </pc:spChg>
       </pc:sldChg>
@@ -1261,11 +1271,19 @@
         </pc:picChg>
       </pc:sldChg>
       <pc:sldChg chg="modSp mod">
-        <pc:chgData name="Ismaël Tuo" userId="fca7baf0e513a1e6" providerId="LiveId" clId="{E7E317F0-1E26-4BB4-BF77-FD59F7E1022E}" dt="2023-09-23T09:24:15.463" v="52" actId="14100"/>
+        <pc:chgData name="Ismaël Tuo" userId="fca7baf0e513a1e6" providerId="LiveId" clId="{E7E317F0-1E26-4BB4-BF77-FD59F7E1022E}" dt="2023-10-01T14:58:10.982" v="4340" actId="20577"/>
         <pc:sldMkLst>
           <pc:docMk/>
           <pc:sldMk cId="687520318" sldId="294"/>
         </pc:sldMkLst>
+        <pc:spChg chg="mod">
+          <ac:chgData name="Ismaël Tuo" userId="fca7baf0e513a1e6" providerId="LiveId" clId="{E7E317F0-1E26-4BB4-BF77-FD59F7E1022E}" dt="2023-10-01T14:58:10.982" v="4340" actId="20577"/>
+          <ac:spMkLst>
+            <pc:docMk/>
+            <pc:sldMk cId="687520318" sldId="294"/>
+            <ac:spMk id="6" creationId="{84F10693-2FE8-EFC8-8DB6-84BFD181D260}"/>
+          </ac:spMkLst>
+        </pc:spChg>
         <pc:picChg chg="mod">
           <ac:chgData name="Ismaël Tuo" userId="fca7baf0e513a1e6" providerId="LiveId" clId="{E7E317F0-1E26-4BB4-BF77-FD59F7E1022E}" dt="2023-09-23T09:24:15.463" v="52" actId="14100"/>
           <ac:picMkLst>
@@ -1329,6 +1347,211 @@
             <ac:picMk id="16" creationId="{A378714C-B387-DDFD-BE7A-02ED13BE7BC5}"/>
           </ac:picMkLst>
         </pc:picChg>
+      </pc:sldChg>
+      <pc:sldChg chg="addSp delSp modSp mod">
+        <pc:chgData name="Ismaël Tuo" userId="fca7baf0e513a1e6" providerId="LiveId" clId="{E7E317F0-1E26-4BB4-BF77-FD59F7E1022E}" dt="2023-10-01T14:44:13.778" v="4317" actId="20577"/>
+        <pc:sldMkLst>
+          <pc:docMk/>
+          <pc:sldMk cId="335285156" sldId="296"/>
+        </pc:sldMkLst>
+        <pc:spChg chg="add mod">
+          <ac:chgData name="Ismaël Tuo" userId="fca7baf0e513a1e6" providerId="LiveId" clId="{E7E317F0-1E26-4BB4-BF77-FD59F7E1022E}" dt="2023-10-01T14:02:01.950" v="909" actId="20577"/>
+          <ac:spMkLst>
+            <pc:docMk/>
+            <pc:sldMk cId="335285156" sldId="296"/>
+            <ac:spMk id="2" creationId="{30762B68-20AD-E048-3AB2-67EF1C3DE0A6}"/>
+          </ac:spMkLst>
+        </pc:spChg>
+        <pc:spChg chg="add mod">
+          <ac:chgData name="Ismaël Tuo" userId="fca7baf0e513a1e6" providerId="LiveId" clId="{E7E317F0-1E26-4BB4-BF77-FD59F7E1022E}" dt="2023-10-01T14:07:21.744" v="1710" actId="20577"/>
+          <ac:spMkLst>
+            <pc:docMk/>
+            <pc:sldMk cId="335285156" sldId="296"/>
+            <ac:spMk id="7" creationId="{FCD1A551-D5DA-D79A-72E1-60BA3F6C6A7A}"/>
+          </ac:spMkLst>
+        </pc:spChg>
+        <pc:spChg chg="add mod">
+          <ac:chgData name="Ismaël Tuo" userId="fca7baf0e513a1e6" providerId="LiveId" clId="{E7E317F0-1E26-4BB4-BF77-FD59F7E1022E}" dt="2023-10-01T14:26:27.002" v="2922" actId="1076"/>
+          <ac:spMkLst>
+            <pc:docMk/>
+            <pc:sldMk cId="335285156" sldId="296"/>
+            <ac:spMk id="8" creationId="{58A81F51-FD9D-F852-E607-8C9777EC23E4}"/>
+          </ac:spMkLst>
+        </pc:spChg>
+        <pc:spChg chg="add mod">
+          <ac:chgData name="Ismaël Tuo" userId="fca7baf0e513a1e6" providerId="LiveId" clId="{E7E317F0-1E26-4BB4-BF77-FD59F7E1022E}" dt="2023-10-01T14:44:13.778" v="4317" actId="20577"/>
+          <ac:spMkLst>
+            <pc:docMk/>
+            <pc:sldMk cId="335285156" sldId="296"/>
+            <ac:spMk id="9" creationId="{472B449E-22A2-D7C9-8C6F-0A009835F9DB}"/>
+          </ac:spMkLst>
+        </pc:spChg>
+        <pc:spChg chg="del">
+          <ac:chgData name="Ismaël Tuo" userId="fca7baf0e513a1e6" providerId="LiveId" clId="{E7E317F0-1E26-4BB4-BF77-FD59F7E1022E}" dt="2023-10-01T14:01:56.564" v="907" actId="478"/>
+          <ac:spMkLst>
+            <pc:docMk/>
+            <pc:sldMk cId="335285156" sldId="296"/>
+            <ac:spMk id="11" creationId="{C27A3656-3CB0-8161-AE9F-B92FBE4F5083}"/>
+          </ac:spMkLst>
+        </pc:spChg>
+      </pc:sldChg>
+      <pc:sldChg chg="addSp delSp modSp add mod">
+        <pc:chgData name="Ismaël Tuo" userId="fca7baf0e513a1e6" providerId="LiveId" clId="{E7E317F0-1E26-4BB4-BF77-FD59F7E1022E}" dt="2023-10-01T14:45:59.731" v="4334" actId="1076"/>
+        <pc:sldMkLst>
+          <pc:docMk/>
+          <pc:sldMk cId="2656507146" sldId="297"/>
+        </pc:sldMkLst>
+        <pc:spChg chg="mod">
+          <ac:chgData name="Ismaël Tuo" userId="fca7baf0e513a1e6" providerId="LiveId" clId="{E7E317F0-1E26-4BB4-BF77-FD59F7E1022E}" dt="2023-10-01T14:45:02.964" v="4319" actId="1076"/>
+          <ac:spMkLst>
+            <pc:docMk/>
+            <pc:sldMk cId="2656507146" sldId="297"/>
+            <ac:spMk id="2" creationId="{30762B68-20AD-E048-3AB2-67EF1C3DE0A6}"/>
+          </ac:spMkLst>
+        </pc:spChg>
+        <pc:spChg chg="mod">
+          <ac:chgData name="Ismaël Tuo" userId="fca7baf0e513a1e6" providerId="LiveId" clId="{E7E317F0-1E26-4BB4-BF77-FD59F7E1022E}" dt="2023-10-01T14:45:05.041" v="4320" actId="1076"/>
+          <ac:spMkLst>
+            <pc:docMk/>
+            <pc:sldMk cId="2656507146" sldId="297"/>
+            <ac:spMk id="7" creationId="{FCD1A551-D5DA-D79A-72E1-60BA3F6C6A7A}"/>
+          </ac:spMkLst>
+        </pc:spChg>
+        <pc:spChg chg="del">
+          <ac:chgData name="Ismaël Tuo" userId="fca7baf0e513a1e6" providerId="LiveId" clId="{E7E317F0-1E26-4BB4-BF77-FD59F7E1022E}" dt="2023-10-01T14:18:26.053" v="2300" actId="478"/>
+          <ac:spMkLst>
+            <pc:docMk/>
+            <pc:sldMk cId="2656507146" sldId="297"/>
+            <ac:spMk id="8" creationId="{58A81F51-FD9D-F852-E607-8C9777EC23E4}"/>
+          </ac:spMkLst>
+        </pc:spChg>
+        <pc:spChg chg="del">
+          <ac:chgData name="Ismaël Tuo" userId="fca7baf0e513a1e6" providerId="LiveId" clId="{E7E317F0-1E26-4BB4-BF77-FD59F7E1022E}" dt="2023-10-01T14:18:24.562" v="2299" actId="478"/>
+          <ac:spMkLst>
+            <pc:docMk/>
+            <pc:sldMk cId="2656507146" sldId="297"/>
+            <ac:spMk id="9" creationId="{472B449E-22A2-D7C9-8C6F-0A009835F9DB}"/>
+          </ac:spMkLst>
+        </pc:spChg>
+        <pc:spChg chg="add mod">
+          <ac:chgData name="Ismaël Tuo" userId="fca7baf0e513a1e6" providerId="LiveId" clId="{E7E317F0-1E26-4BB4-BF77-FD59F7E1022E}" dt="2023-10-01T14:45:08.101" v="4321" actId="1076"/>
+          <ac:spMkLst>
+            <pc:docMk/>
+            <pc:sldMk cId="2656507146" sldId="297"/>
+            <ac:spMk id="10" creationId="{60220270-ECDE-27C4-6E68-F415271D9604}"/>
+          </ac:spMkLst>
+        </pc:spChg>
+        <pc:spChg chg="add mod">
+          <ac:chgData name="Ismaël Tuo" userId="fca7baf0e513a1e6" providerId="LiveId" clId="{E7E317F0-1E26-4BB4-BF77-FD59F7E1022E}" dt="2023-10-01T14:45:10.178" v="4322" actId="1076"/>
+          <ac:spMkLst>
+            <pc:docMk/>
+            <pc:sldMk cId="2656507146" sldId="297"/>
+            <ac:spMk id="11" creationId="{2465370F-D6C4-50C5-D9F0-E7309C29AD6B}"/>
+          </ac:spMkLst>
+        </pc:spChg>
+        <pc:spChg chg="add mod">
+          <ac:chgData name="Ismaël Tuo" userId="fca7baf0e513a1e6" providerId="LiveId" clId="{E7E317F0-1E26-4BB4-BF77-FD59F7E1022E}" dt="2023-10-01T14:45:53.431" v="4332" actId="1076"/>
+          <ac:spMkLst>
+            <pc:docMk/>
+            <pc:sldMk cId="2656507146" sldId="297"/>
+            <ac:spMk id="12" creationId="{B11DD3E0-F2A9-C04C-6934-F8960472A036}"/>
+          </ac:spMkLst>
+        </pc:spChg>
+        <pc:spChg chg="add mod">
+          <ac:chgData name="Ismaël Tuo" userId="fca7baf0e513a1e6" providerId="LiveId" clId="{E7E317F0-1E26-4BB4-BF77-FD59F7E1022E}" dt="2023-10-01T14:45:56.821" v="4333" actId="1076"/>
+          <ac:spMkLst>
+            <pc:docMk/>
+            <pc:sldMk cId="2656507146" sldId="297"/>
+            <ac:spMk id="13" creationId="{EE2FB13B-DCD8-165A-4F3F-9CA9A2E44142}"/>
+          </ac:spMkLst>
+        </pc:spChg>
+        <pc:spChg chg="add mod">
+          <ac:chgData name="Ismaël Tuo" userId="fca7baf0e513a1e6" providerId="LiveId" clId="{E7E317F0-1E26-4BB4-BF77-FD59F7E1022E}" dt="2023-10-01T14:45:59.731" v="4334" actId="1076"/>
+          <ac:spMkLst>
+            <pc:docMk/>
+            <pc:sldMk cId="2656507146" sldId="297"/>
+            <ac:spMk id="14" creationId="{E20CB38B-CA84-DB9B-DFA7-796D6494D659}"/>
+          </ac:spMkLst>
+        </pc:spChg>
+      </pc:sldChg>
+      <pc:sldChg chg="addSp delSp modSp add mod">
+        <pc:chgData name="Ismaël Tuo" userId="fca7baf0e513a1e6" providerId="LiveId" clId="{E7E317F0-1E26-4BB4-BF77-FD59F7E1022E}" dt="2023-10-01T15:04:15.424" v="4341" actId="1076"/>
+        <pc:sldMkLst>
+          <pc:docMk/>
+          <pc:sldMk cId="1514737248" sldId="298"/>
+        </pc:sldMkLst>
+        <pc:spChg chg="del">
+          <ac:chgData name="Ismaël Tuo" userId="fca7baf0e513a1e6" providerId="LiveId" clId="{E7E317F0-1E26-4BB4-BF77-FD59F7E1022E}" dt="2023-10-01T14:30:37.412" v="3232" actId="478"/>
+          <ac:spMkLst>
+            <pc:docMk/>
+            <pc:sldMk cId="1514737248" sldId="298"/>
+            <ac:spMk id="2" creationId="{30762B68-20AD-E048-3AB2-67EF1C3DE0A6}"/>
+          </ac:spMkLst>
+        </pc:spChg>
+        <pc:spChg chg="del">
+          <ac:chgData name="Ismaël Tuo" userId="fca7baf0e513a1e6" providerId="LiveId" clId="{E7E317F0-1E26-4BB4-BF77-FD59F7E1022E}" dt="2023-10-01T14:30:36.069" v="3231" actId="478"/>
+          <ac:spMkLst>
+            <pc:docMk/>
+            <pc:sldMk cId="1514737248" sldId="298"/>
+            <ac:spMk id="7" creationId="{FCD1A551-D5DA-D79A-72E1-60BA3F6C6A7A}"/>
+          </ac:spMkLst>
+        </pc:spChg>
+        <pc:spChg chg="add mod">
+          <ac:chgData name="Ismaël Tuo" userId="fca7baf0e513a1e6" providerId="LiveId" clId="{E7E317F0-1E26-4BB4-BF77-FD59F7E1022E}" dt="2023-10-01T14:45:34.373" v="4329" actId="1076"/>
+          <ac:spMkLst>
+            <pc:docMk/>
+            <pc:sldMk cId="1514737248" sldId="298"/>
+            <ac:spMk id="8" creationId="{EB032A17-4451-B99F-ABFE-13F9F5C9B8B6}"/>
+          </ac:spMkLst>
+        </pc:spChg>
+        <pc:spChg chg="add mod">
+          <ac:chgData name="Ismaël Tuo" userId="fca7baf0e513a1e6" providerId="LiveId" clId="{E7E317F0-1E26-4BB4-BF77-FD59F7E1022E}" dt="2023-10-01T14:45:31.584" v="4328" actId="1076"/>
+          <ac:spMkLst>
+            <pc:docMk/>
+            <pc:sldMk cId="1514737248" sldId="298"/>
+            <ac:spMk id="9" creationId="{95B49699-996F-96CB-6EDA-0C2CECAD46E3}"/>
+          </ac:spMkLst>
+        </pc:spChg>
+        <pc:spChg chg="del">
+          <ac:chgData name="Ismaël Tuo" userId="fca7baf0e513a1e6" providerId="LiveId" clId="{E7E317F0-1E26-4BB4-BF77-FD59F7E1022E}" dt="2023-10-01T14:30:34.612" v="3230" actId="478"/>
+          <ac:spMkLst>
+            <pc:docMk/>
+            <pc:sldMk cId="1514737248" sldId="298"/>
+            <ac:spMk id="10" creationId="{60220270-ECDE-27C4-6E68-F415271D9604}"/>
+          </ac:spMkLst>
+        </pc:spChg>
+        <pc:spChg chg="del">
+          <ac:chgData name="Ismaël Tuo" userId="fca7baf0e513a1e6" providerId="LiveId" clId="{E7E317F0-1E26-4BB4-BF77-FD59F7E1022E}" dt="2023-10-01T14:30:32.744" v="3229" actId="478"/>
+          <ac:spMkLst>
+            <pc:docMk/>
+            <pc:sldMk cId="1514737248" sldId="298"/>
+            <ac:spMk id="11" creationId="{2465370F-D6C4-50C5-D9F0-E7309C29AD6B}"/>
+          </ac:spMkLst>
+        </pc:spChg>
+        <pc:spChg chg="mod">
+          <ac:chgData name="Ismaël Tuo" userId="fca7baf0e513a1e6" providerId="LiveId" clId="{E7E317F0-1E26-4BB4-BF77-FD59F7E1022E}" dt="2023-10-01T15:04:15.424" v="4341" actId="1076"/>
+          <ac:spMkLst>
+            <pc:docMk/>
+            <pc:sldMk cId="1514737248" sldId="298"/>
+            <ac:spMk id="12" creationId="{B11DD3E0-F2A9-C04C-6934-F8960472A036}"/>
+          </ac:spMkLst>
+        </pc:spChg>
+        <pc:spChg chg="mod">
+          <ac:chgData name="Ismaël Tuo" userId="fca7baf0e513a1e6" providerId="LiveId" clId="{E7E317F0-1E26-4BB4-BF77-FD59F7E1022E}" dt="2023-10-01T14:47:45.407" v="4335" actId="1076"/>
+          <ac:spMkLst>
+            <pc:docMk/>
+            <pc:sldMk cId="1514737248" sldId="298"/>
+            <ac:spMk id="13" creationId="{EE2FB13B-DCD8-165A-4F3F-9CA9A2E44142}"/>
+          </ac:spMkLst>
+        </pc:spChg>
+        <pc:spChg chg="add del mod">
+          <ac:chgData name="Ismaël Tuo" userId="fca7baf0e513a1e6" providerId="LiveId" clId="{E7E317F0-1E26-4BB4-BF77-FD59F7E1022E}" dt="2023-10-01T14:45:20.640" v="4325" actId="21"/>
+          <ac:spMkLst>
+            <pc:docMk/>
+            <pc:sldMk cId="1514737248" sldId="298"/>
+            <ac:spMk id="14" creationId="{F92C4F08-5F88-5ACA-3758-6698A31671F7}"/>
+          </ac:spMkLst>
+        </pc:spChg>
       </pc:sldChg>
     </pc:docChg>
   </pc:docChgLst>
@@ -1417,7 +1640,7 @@
           <a:p>
             <a:fld id="{5D1B8971-FAD5-A544-A565-5C81831E2E08}" type="datetimeFigureOut">
               <a:rPr lang="fr-FR" smtClean="0"/>
-              <a:t>23/09/2023</a:t>
+              <a:t>01/10/2023</a:t>
             </a:fld>
             <a:endParaRPr lang="fr-FR"/>
           </a:p>
@@ -1847,7 +2070,7 @@
           <a:p>
             <a:fld id="{446AF453-C717-E044-9B61-C449088DBB9F}" type="datetime1">
               <a:rPr lang="fr-FR" smtClean="0"/>
-              <a:t>23/09/2023</a:t>
+              <a:t>01/10/2023</a:t>
             </a:fld>
             <a:endParaRPr lang="fr-FR"/>
           </a:p>
@@ -2021,7 +2244,7 @@
           <a:p>
             <a:fld id="{0AD74B8B-4B66-A54B-A7E1-EB9F6C09CE67}" type="datetime1">
               <a:rPr lang="fr-FR" smtClean="0"/>
-              <a:t>23/09/2023</a:t>
+              <a:t>01/10/2023</a:t>
             </a:fld>
             <a:endParaRPr lang="fr-FR"/>
           </a:p>
@@ -2205,7 +2428,7 @@
           <a:p>
             <a:fld id="{9584F9F2-42A0-CD42-8013-986AEAF97421}" type="datetime1">
               <a:rPr lang="fr-FR" smtClean="0"/>
-              <a:t>23/09/2023</a:t>
+              <a:t>01/10/2023</a:t>
             </a:fld>
             <a:endParaRPr lang="fr-FR"/>
           </a:p>
@@ -2379,7 +2602,7 @@
           <a:p>
             <a:fld id="{DAB9BD9F-3179-BB4C-96AB-C40862581685}" type="datetime1">
               <a:rPr lang="fr-FR" smtClean="0"/>
-              <a:t>23/09/2023</a:t>
+              <a:t>01/10/2023</a:t>
             </a:fld>
             <a:endParaRPr lang="fr-FR"/>
           </a:p>
@@ -2651,7 +2874,7 @@
           <a:p>
             <a:fld id="{A664DE96-64FF-BC43-8A9C-18ED43A528D6}" type="datetime1">
               <a:rPr lang="fr-FR" smtClean="0"/>
-              <a:t>23/09/2023</a:t>
+              <a:t>01/10/2023</a:t>
             </a:fld>
             <a:endParaRPr lang="fr-FR"/>
           </a:p>
@@ -2887,7 +3110,7 @@
           <a:p>
             <a:fld id="{2C8FE800-9F9B-1C4F-A1CD-9EF46842C4CA}" type="datetime1">
               <a:rPr lang="fr-FR" smtClean="0"/>
-              <a:t>23/09/2023</a:t>
+              <a:t>01/10/2023</a:t>
             </a:fld>
             <a:endParaRPr lang="fr-FR"/>
           </a:p>
@@ -3250,7 +3473,7 @@
           <a:p>
             <a:fld id="{0F7DED4E-8CB4-EF40-A349-EFC02EC7784E}" type="datetime1">
               <a:rPr lang="fr-FR" smtClean="0"/>
-              <a:t>23/09/2023</a:t>
+              <a:t>01/10/2023</a:t>
             </a:fld>
             <a:endParaRPr lang="fr-FR"/>
           </a:p>
@@ -3395,7 +3618,7 @@
           <a:p>
             <a:fld id="{5BB88D77-E8A2-E24F-81D2-817E60779F3E}" type="datetime1">
               <a:rPr lang="fr-FR" smtClean="0"/>
-              <a:t>23/09/2023</a:t>
+              <a:t>01/10/2023</a:t>
             </a:fld>
             <a:endParaRPr lang="fr-FR"/>
           </a:p>
@@ -3494,7 +3717,7 @@
           <a:p>
             <a:fld id="{817F964E-5B57-884A-A1B8-925BFA5276AF}" type="datetime1">
               <a:rPr lang="fr-FR" smtClean="0"/>
-              <a:t>23/09/2023</a:t>
+              <a:t>01/10/2023</a:t>
             </a:fld>
             <a:endParaRPr lang="fr-FR"/>
           </a:p>
@@ -3855,7 +4078,7 @@
           <a:p>
             <a:fld id="{D5636CD0-A2E6-1543-A0E5-C829C16FEE55}" type="datetime1">
               <a:rPr lang="fr-FR" smtClean="0"/>
-              <a:t>23/09/2023</a:t>
+              <a:t>01/10/2023</a:t>
             </a:fld>
             <a:endParaRPr lang="fr-FR"/>
           </a:p>
@@ -4216,7 +4439,7 @@
           <a:p>
             <a:fld id="{CEE5CE4A-5B1A-1846-BA66-722BDB7A9525}" type="datetime1">
               <a:rPr lang="fr-FR" smtClean="0"/>
-              <a:t>23/09/2023</a:t>
+              <a:t>01/10/2023</a:t>
             </a:fld>
             <a:endParaRPr lang="fr-FR"/>
           </a:p>
@@ -4463,7 +4686,7 @@
           <a:p>
             <a:fld id="{55A13D9C-CA6E-9C45-8634-4423EBFFD553}" type="datetime1">
               <a:rPr lang="fr-FR" smtClean="0"/>
-              <a:t>23/09/2023</a:t>
+              <a:t>01/10/2023</a:t>
             </a:fld>
             <a:endParaRPr lang="fr-FR"/>
           </a:p>
@@ -6636,79 +6859,6 @@
           </a:p>
         </p:txBody>
       </p:sp>
-      <p:sp>
-        <p:nvSpPr>
-          <p:cNvPr id="11" name="ZoneTexte 10">
-            <a:extLst>
-              <a:ext uri="{FF2B5EF4-FFF2-40B4-BE49-F238E27FC236}">
-                <a16:creationId xmlns:a16="http://schemas.microsoft.com/office/drawing/2014/main" id="{C27A3656-3CB0-8161-AE9F-B92FBE4F5083}"/>
-              </a:ext>
-            </a:extLst>
-          </p:cNvPr>
-          <p:cNvSpPr txBox="1"/>
-          <p:nvPr/>
-        </p:nvSpPr>
-        <p:spPr>
-          <a:xfrm>
-            <a:off x="419077" y="859127"/>
-            <a:ext cx="11178450" cy="400110"/>
-          </a:xfrm>
-          <a:prstGeom prst="rect">
-            <a:avLst/>
-          </a:prstGeom>
-          <a:noFill/>
-        </p:spPr>
-        <p:txBody>
-          <a:bodyPr wrap="square" rtlCol="0">
-            <a:spAutoFit/>
-          </a:bodyPr>
-          <a:lstStyle>
-            <a:defPPr>
-              <a:defRPr lang="en-US"/>
-            </a:defPPr>
-            <a:lvl1pPr>
-              <a:defRPr sz="2000"/>
-            </a:lvl1pPr>
-          </a:lstStyle>
-          <a:p>
-            <a:r>
-              <a:rPr lang="fr-FR" dirty="0">
-                <a:latin typeface="Times New Roman" panose="02020603050405020304" pitchFamily="18" charset="0"/>
-                <a:cs typeface="Times New Roman" panose="02020603050405020304" pitchFamily="18" charset="0"/>
-              </a:rPr>
-              <a:t>Une fonction en Python s’écrit dans un fichier </a:t>
-            </a:r>
-            <a:r>
-              <a:rPr lang="fr-FR" b="1" dirty="0">
-                <a:latin typeface="Times New Roman" panose="02020603050405020304" pitchFamily="18" charset="0"/>
-                <a:cs typeface="Times New Roman" panose="02020603050405020304" pitchFamily="18" charset="0"/>
-              </a:rPr>
-              <a:t>.</a:t>
-            </a:r>
-            <a:r>
-              <a:rPr lang="fr-FR" b="1" dirty="0" err="1">
-                <a:latin typeface="Times New Roman" panose="02020603050405020304" pitchFamily="18" charset="0"/>
-                <a:cs typeface="Times New Roman" panose="02020603050405020304" pitchFamily="18" charset="0"/>
-              </a:rPr>
-              <a:t>py</a:t>
-            </a:r>
-            <a:r>
-              <a:rPr lang="fr-FR" b="1" dirty="0">
-                <a:latin typeface="Times New Roman" panose="02020603050405020304" pitchFamily="18" charset="0"/>
-                <a:cs typeface="Times New Roman" panose="02020603050405020304" pitchFamily="18" charset="0"/>
-              </a:rPr>
-              <a:t> </a:t>
-            </a:r>
-            <a:r>
-              <a:rPr lang="fr-FR" dirty="0">
-                <a:latin typeface="Times New Roman" panose="02020603050405020304" pitchFamily="18" charset="0"/>
-                <a:cs typeface="Times New Roman" panose="02020603050405020304" pitchFamily="18" charset="0"/>
-              </a:rPr>
-              <a:t>avec la syntaxe suivante:</a:t>
-            </a:r>
-          </a:p>
-        </p:txBody>
-      </p:sp>
       <p:cxnSp>
         <p:nvCxnSpPr>
           <p:cNvPr id="3" name="Connecteur droit 2">
@@ -6748,6 +6898,343 @@
           </a:fontRef>
         </p:style>
       </p:cxnSp>
+      <p:sp>
+        <p:nvSpPr>
+          <p:cNvPr id="2" name="ZoneTexte 1">
+            <a:extLst>
+              <a:ext uri="{FF2B5EF4-FFF2-40B4-BE49-F238E27FC236}">
+                <a16:creationId xmlns:a16="http://schemas.microsoft.com/office/drawing/2014/main" id="{30762B68-20AD-E048-3AB2-67EF1C3DE0A6}"/>
+              </a:ext>
+            </a:extLst>
+          </p:cNvPr>
+          <p:cNvSpPr txBox="1"/>
+          <p:nvPr/>
+        </p:nvSpPr>
+        <p:spPr>
+          <a:xfrm>
+            <a:off x="397565" y="859559"/>
+            <a:ext cx="11569148" cy="400110"/>
+          </a:xfrm>
+          <a:prstGeom prst="rect">
+            <a:avLst/>
+          </a:prstGeom>
+          <a:noFill/>
+        </p:spPr>
+        <p:txBody>
+          <a:bodyPr wrap="square" rtlCol="0">
+            <a:spAutoFit/>
+          </a:bodyPr>
+          <a:lstStyle/>
+          <a:p>
+            <a:r>
+              <a:rPr lang="fr-FR" sz="2000" b="1" u="sng" dirty="0">
+                <a:latin typeface="Times New Roman" panose="02020603050405020304" pitchFamily="18" charset="0"/>
+                <a:cs typeface="Times New Roman" panose="02020603050405020304" pitchFamily="18" charset="0"/>
+              </a:rPr>
+              <a:t>Exercice 1</a:t>
+            </a:r>
+          </a:p>
+        </p:txBody>
+      </p:sp>
+      <p:sp>
+        <p:nvSpPr>
+          <p:cNvPr id="7" name="ZoneTexte 6">
+            <a:extLst>
+              <a:ext uri="{FF2B5EF4-FFF2-40B4-BE49-F238E27FC236}">
+                <a16:creationId xmlns:a16="http://schemas.microsoft.com/office/drawing/2014/main" id="{FCD1A551-D5DA-D79A-72E1-60BA3F6C6A7A}"/>
+              </a:ext>
+            </a:extLst>
+          </p:cNvPr>
+          <p:cNvSpPr txBox="1"/>
+          <p:nvPr/>
+        </p:nvSpPr>
+        <p:spPr>
+          <a:xfrm>
+            <a:off x="397565" y="1287773"/>
+            <a:ext cx="11569148" cy="2862322"/>
+          </a:xfrm>
+          <a:prstGeom prst="rect">
+            <a:avLst/>
+          </a:prstGeom>
+          <a:noFill/>
+        </p:spPr>
+        <p:txBody>
+          <a:bodyPr wrap="square" rtlCol="0">
+            <a:spAutoFit/>
+          </a:bodyPr>
+          <a:lstStyle/>
+          <a:p>
+            <a:r>
+              <a:rPr lang="fr-FR" sz="2000" dirty="0">
+                <a:latin typeface="Times New Roman" panose="02020603050405020304" pitchFamily="18" charset="0"/>
+                <a:cs typeface="Times New Roman" panose="02020603050405020304" pitchFamily="18" charset="0"/>
+              </a:rPr>
+              <a:t>Définir une fonction </a:t>
+            </a:r>
+            <a:r>
+              <a:rPr lang="fr-FR" sz="2000" b="1" dirty="0">
+                <a:latin typeface="Times New Roman" panose="02020603050405020304" pitchFamily="18" charset="0"/>
+                <a:cs typeface="Times New Roman" panose="02020603050405020304" pitchFamily="18" charset="0"/>
+              </a:rPr>
+              <a:t>maximum(nbre1, nbre2, nbre3) </a:t>
+            </a:r>
+            <a:r>
+              <a:rPr lang="fr-FR" sz="2000" dirty="0">
+                <a:latin typeface="Times New Roman" panose="02020603050405020304" pitchFamily="18" charset="0"/>
+                <a:cs typeface="Times New Roman" panose="02020603050405020304" pitchFamily="18" charset="0"/>
+              </a:rPr>
+              <a:t>qui renvoie le plus grand de 3 nombres nbre1, nbre2, nbre3 fournis en arguments. Par exemple </a:t>
+            </a:r>
+            <a:r>
+              <a:rPr lang="fr-FR" sz="2000" b="1" dirty="0">
+                <a:latin typeface="Times New Roman" panose="02020603050405020304" pitchFamily="18" charset="0"/>
+                <a:cs typeface="Times New Roman" panose="02020603050405020304" pitchFamily="18" charset="0"/>
+              </a:rPr>
+              <a:t>maximum(2, 5, 4) </a:t>
+            </a:r>
+            <a:r>
+              <a:rPr lang="fr-FR" sz="2000" dirty="0">
+                <a:latin typeface="Times New Roman" panose="02020603050405020304" pitchFamily="18" charset="0"/>
+                <a:cs typeface="Times New Roman" panose="02020603050405020304" pitchFamily="18" charset="0"/>
+              </a:rPr>
+              <a:t>doit renvoyer 5.</a:t>
+            </a:r>
+          </a:p>
+          <a:p>
+            <a:r>
+              <a:rPr lang="fr-FR" sz="2000" dirty="0">
+                <a:latin typeface="Times New Roman" panose="02020603050405020304" pitchFamily="18" charset="0"/>
+                <a:cs typeface="Times New Roman" panose="02020603050405020304" pitchFamily="18" charset="0"/>
+              </a:rPr>
+              <a:t>Définir une fonction </a:t>
+            </a:r>
+            <a:r>
+              <a:rPr lang="fr-FR" sz="2000" b="1" dirty="0">
+                <a:latin typeface="Times New Roman" panose="02020603050405020304" pitchFamily="18" charset="0"/>
+                <a:cs typeface="Times New Roman" panose="02020603050405020304" pitchFamily="18" charset="0"/>
+              </a:rPr>
+              <a:t>minimum(nbre1, nbre2, nbre3) </a:t>
+            </a:r>
+            <a:r>
+              <a:rPr lang="fr-FR" sz="2000" dirty="0">
+                <a:latin typeface="Times New Roman" panose="02020603050405020304" pitchFamily="18" charset="0"/>
+                <a:cs typeface="Times New Roman" panose="02020603050405020304" pitchFamily="18" charset="0"/>
+              </a:rPr>
+              <a:t>qui renvoie le plus petit de 3 nombres nbre1, nbre2, nbre3 fournis en arguments. Par exemple </a:t>
+            </a:r>
+            <a:r>
+              <a:rPr lang="fr-FR" sz="2000" b="1" dirty="0">
+                <a:latin typeface="Times New Roman" panose="02020603050405020304" pitchFamily="18" charset="0"/>
+                <a:cs typeface="Times New Roman" panose="02020603050405020304" pitchFamily="18" charset="0"/>
+              </a:rPr>
+              <a:t>maximum(2, 5, 4) </a:t>
+            </a:r>
+            <a:r>
+              <a:rPr lang="fr-FR" sz="2000" dirty="0">
+                <a:latin typeface="Times New Roman" panose="02020603050405020304" pitchFamily="18" charset="0"/>
+                <a:cs typeface="Times New Roman" panose="02020603050405020304" pitchFamily="18" charset="0"/>
+              </a:rPr>
+              <a:t>doit renvoyer 2.</a:t>
+            </a:r>
+          </a:p>
+          <a:p>
+            <a:r>
+              <a:rPr lang="fr-FR" sz="2000" dirty="0">
+                <a:latin typeface="Times New Roman" panose="02020603050405020304" pitchFamily="18" charset="0"/>
+                <a:cs typeface="Times New Roman" panose="02020603050405020304" pitchFamily="18" charset="0"/>
+              </a:rPr>
+              <a:t>Ecrire un programme qui demande 3 nombres à l’utilisateur, ensuite le programme doit utiliser les fonctions définies précédemment pour afficher le plus petit et le plus grand des nombres fournis.</a:t>
+            </a:r>
+          </a:p>
+          <a:p>
+            <a:r>
+              <a:rPr lang="fr-FR" sz="2000" dirty="0">
+                <a:latin typeface="Times New Roman" panose="02020603050405020304" pitchFamily="18" charset="0"/>
+                <a:cs typeface="Times New Roman" panose="02020603050405020304" pitchFamily="18" charset="0"/>
+              </a:rPr>
+              <a:t>Par exemple si l’utilisateur entre 2, 5 et 4, le programme doit afficher:</a:t>
+            </a:r>
+          </a:p>
+          <a:p>
+            <a:r>
+              <a:rPr lang="fr-FR" sz="2000" dirty="0">
+                <a:latin typeface="Times New Roman" panose="02020603050405020304" pitchFamily="18" charset="0"/>
+                <a:cs typeface="Times New Roman" panose="02020603050405020304" pitchFamily="18" charset="0"/>
+              </a:rPr>
+              <a:t>« Le plus petit de ces nombres est 2. »</a:t>
+            </a:r>
+          </a:p>
+          <a:p>
+            <a:r>
+              <a:rPr lang="fr-FR" sz="2000" dirty="0">
+                <a:latin typeface="Times New Roman" panose="02020603050405020304" pitchFamily="18" charset="0"/>
+                <a:cs typeface="Times New Roman" panose="02020603050405020304" pitchFamily="18" charset="0"/>
+              </a:rPr>
+              <a:t>« Le plus grand de ces nombres est 5. »</a:t>
+            </a:r>
+          </a:p>
+        </p:txBody>
+      </p:sp>
+      <p:sp>
+        <p:nvSpPr>
+          <p:cNvPr id="8" name="ZoneTexte 7">
+            <a:extLst>
+              <a:ext uri="{FF2B5EF4-FFF2-40B4-BE49-F238E27FC236}">
+                <a16:creationId xmlns:a16="http://schemas.microsoft.com/office/drawing/2014/main" id="{58A81F51-FD9D-F852-E607-8C9777EC23E4}"/>
+              </a:ext>
+            </a:extLst>
+          </p:cNvPr>
+          <p:cNvSpPr txBox="1"/>
+          <p:nvPr/>
+        </p:nvSpPr>
+        <p:spPr>
+          <a:xfrm>
+            <a:off x="397564" y="4150095"/>
+            <a:ext cx="11569148" cy="400110"/>
+          </a:xfrm>
+          <a:prstGeom prst="rect">
+            <a:avLst/>
+          </a:prstGeom>
+          <a:noFill/>
+        </p:spPr>
+        <p:txBody>
+          <a:bodyPr wrap="square" rtlCol="0">
+            <a:spAutoFit/>
+          </a:bodyPr>
+          <a:lstStyle/>
+          <a:p>
+            <a:r>
+              <a:rPr lang="fr-FR" sz="2000" b="1" u="sng" dirty="0">
+                <a:latin typeface="Times New Roman" panose="02020603050405020304" pitchFamily="18" charset="0"/>
+                <a:cs typeface="Times New Roman" panose="02020603050405020304" pitchFamily="18" charset="0"/>
+              </a:rPr>
+              <a:t>Exercice 2</a:t>
+            </a:r>
+          </a:p>
+        </p:txBody>
+      </p:sp>
+      <p:sp>
+        <p:nvSpPr>
+          <p:cNvPr id="9" name="ZoneTexte 8">
+            <a:extLst>
+              <a:ext uri="{FF2B5EF4-FFF2-40B4-BE49-F238E27FC236}">
+                <a16:creationId xmlns:a16="http://schemas.microsoft.com/office/drawing/2014/main" id="{472B449E-22A2-D7C9-8C6F-0A009835F9DB}"/>
+              </a:ext>
+            </a:extLst>
+          </p:cNvPr>
+          <p:cNvSpPr txBox="1"/>
+          <p:nvPr/>
+        </p:nvSpPr>
+        <p:spPr>
+          <a:xfrm>
+            <a:off x="397564" y="4590869"/>
+            <a:ext cx="11569148" cy="1323439"/>
+          </a:xfrm>
+          <a:prstGeom prst="rect">
+            <a:avLst/>
+          </a:prstGeom>
+          <a:noFill/>
+        </p:spPr>
+        <p:txBody>
+          <a:bodyPr wrap="square" rtlCol="0">
+            <a:spAutoFit/>
+          </a:bodyPr>
+          <a:lstStyle/>
+          <a:p>
+            <a:r>
+              <a:rPr lang="fr-FR" sz="2000" dirty="0">
+                <a:latin typeface="Times New Roman" panose="02020603050405020304" pitchFamily="18" charset="0"/>
+                <a:cs typeface="Times New Roman" panose="02020603050405020304" pitchFamily="18" charset="0"/>
+              </a:rPr>
+              <a:t>Définir une fonction </a:t>
+            </a:r>
+            <a:r>
+              <a:rPr lang="fr-FR" sz="2000" b="1" dirty="0" err="1">
+                <a:latin typeface="Times New Roman" panose="02020603050405020304" pitchFamily="18" charset="0"/>
+                <a:cs typeface="Times New Roman" panose="02020603050405020304" pitchFamily="18" charset="0"/>
+              </a:rPr>
+              <a:t>compteurCaractere</a:t>
+            </a:r>
+            <a:r>
+              <a:rPr lang="fr-FR" sz="2000" b="1" dirty="0">
+                <a:latin typeface="Times New Roman" panose="02020603050405020304" pitchFamily="18" charset="0"/>
+                <a:cs typeface="Times New Roman" panose="02020603050405020304" pitchFamily="18" charset="0"/>
+              </a:rPr>
+              <a:t>(</a:t>
+            </a:r>
+            <a:r>
+              <a:rPr lang="fr-FR" sz="2000" b="1" dirty="0" err="1">
+                <a:latin typeface="Times New Roman" panose="02020603050405020304" pitchFamily="18" charset="0"/>
+                <a:cs typeface="Times New Roman" panose="02020603050405020304" pitchFamily="18" charset="0"/>
+              </a:rPr>
+              <a:t>carac</a:t>
+            </a:r>
+            <a:r>
+              <a:rPr lang="fr-FR" sz="2000" b="1" dirty="0">
+                <a:latin typeface="Times New Roman" panose="02020603050405020304" pitchFamily="18" charset="0"/>
+                <a:cs typeface="Times New Roman" panose="02020603050405020304" pitchFamily="18" charset="0"/>
+              </a:rPr>
+              <a:t>, phrase) </a:t>
+            </a:r>
+            <a:r>
+              <a:rPr lang="fr-FR" sz="2000" dirty="0">
+                <a:latin typeface="Times New Roman" panose="02020603050405020304" pitchFamily="18" charset="0"/>
+                <a:cs typeface="Times New Roman" panose="02020603050405020304" pitchFamily="18" charset="0"/>
+              </a:rPr>
+              <a:t>qui renvoie le nombre de fois que l’on rencontre le caractère </a:t>
+            </a:r>
+            <a:r>
+              <a:rPr lang="fr-FR" sz="2000" b="1" dirty="0" err="1">
+                <a:latin typeface="Times New Roman" panose="02020603050405020304" pitchFamily="18" charset="0"/>
+                <a:cs typeface="Times New Roman" panose="02020603050405020304" pitchFamily="18" charset="0"/>
+              </a:rPr>
+              <a:t>carac</a:t>
+            </a:r>
+            <a:r>
+              <a:rPr lang="fr-FR" sz="2000" dirty="0">
+                <a:latin typeface="Times New Roman" panose="02020603050405020304" pitchFamily="18" charset="0"/>
+                <a:cs typeface="Times New Roman" panose="02020603050405020304" pitchFamily="18" charset="0"/>
+              </a:rPr>
+              <a:t> dans la chaîne de caractères </a:t>
+            </a:r>
+            <a:r>
+              <a:rPr lang="fr-FR" sz="2000" b="1" dirty="0">
+                <a:latin typeface="Times New Roman" panose="02020603050405020304" pitchFamily="18" charset="0"/>
+                <a:cs typeface="Times New Roman" panose="02020603050405020304" pitchFamily="18" charset="0"/>
+              </a:rPr>
+              <a:t>phrase</a:t>
+            </a:r>
+            <a:r>
+              <a:rPr lang="fr-FR" sz="2000" dirty="0">
+                <a:latin typeface="Times New Roman" panose="02020603050405020304" pitchFamily="18" charset="0"/>
+                <a:cs typeface="Times New Roman" panose="02020603050405020304" pitchFamily="18" charset="0"/>
+              </a:rPr>
+              <a:t>. Par exemple </a:t>
+            </a:r>
+            <a:r>
+              <a:rPr lang="fr-FR" sz="2000" b="1" dirty="0" err="1">
+                <a:latin typeface="Times New Roman" panose="02020603050405020304" pitchFamily="18" charset="0"/>
+                <a:cs typeface="Times New Roman" panose="02020603050405020304" pitchFamily="18" charset="0"/>
+              </a:rPr>
+              <a:t>compteurCaractere</a:t>
+            </a:r>
+            <a:r>
+              <a:rPr lang="fr-FR" sz="2000" b="1" dirty="0">
+                <a:latin typeface="Times New Roman" panose="02020603050405020304" pitchFamily="18" charset="0"/>
+                <a:cs typeface="Times New Roman" panose="02020603050405020304" pitchFamily="18" charset="0"/>
+              </a:rPr>
+              <a:t>("e", "Salut tout le monde")</a:t>
+            </a:r>
+            <a:r>
+              <a:rPr lang="fr-FR" sz="2000" dirty="0">
+                <a:latin typeface="Times New Roman" panose="02020603050405020304" pitchFamily="18" charset="0"/>
+                <a:cs typeface="Times New Roman" panose="02020603050405020304" pitchFamily="18" charset="0"/>
+              </a:rPr>
+              <a:t> doit renvoyer 2. Ecrire un programme qui demande une phrase à l’utilisateur, ensuite un caractère à rechercher, le programme doit afficher le nombre de fois où le caractère a été trouvé dans la phrase.</a:t>
+            </a:r>
+          </a:p>
+        </p:txBody>
+      </p:sp>
     </p:spTree>
     <p:extLst>
       <p:ext uri="{BB962C8B-B14F-4D97-AF65-F5344CB8AC3E}">
@@ -6762,6 +7249,1061 @@
 </file>
 
 <file path=ppt/slides/slide14.xml><?xml version="1.0" encoding="utf-8"?>
+<p:sld xmlns:a="http://schemas.openxmlformats.org/drawingml/2006/main" xmlns:r="http://schemas.openxmlformats.org/officeDocument/2006/relationships" xmlns:p="http://schemas.openxmlformats.org/presentationml/2006/main">
+  <p:cSld>
+    <p:spTree>
+      <p:nvGrpSpPr>
+        <p:cNvPr id="1" name=""/>
+        <p:cNvGrpSpPr/>
+        <p:nvPr/>
+      </p:nvGrpSpPr>
+      <p:grpSpPr>
+        <a:xfrm>
+          <a:off x="0" y="0"/>
+          <a:ext cx="0" cy="0"/>
+          <a:chOff x="0" y="0"/>
+          <a:chExt cx="0" cy="0"/>
+        </a:xfrm>
+      </p:grpSpPr>
+      <p:sp>
+        <p:nvSpPr>
+          <p:cNvPr id="4" name="Espace réservé du pied de page 3">
+            <a:extLst>
+              <a:ext uri="{FF2B5EF4-FFF2-40B4-BE49-F238E27FC236}">
+                <a16:creationId xmlns:a16="http://schemas.microsoft.com/office/drawing/2014/main" id="{8FEEC940-4BFF-956C-713A-1CE73C436B6F}"/>
+              </a:ext>
+            </a:extLst>
+          </p:cNvPr>
+          <p:cNvSpPr>
+            <a:spLocks noGrp="1"/>
+          </p:cNvSpPr>
+          <p:nvPr>
+            <p:ph type="ftr" sz="quarter" idx="11"/>
+          </p:nvPr>
+        </p:nvSpPr>
+        <p:spPr/>
+        <p:txBody>
+          <a:bodyPr/>
+          <a:lstStyle/>
+          <a:p>
+            <a:r>
+              <a:rPr lang="fr-FR"/>
+              <a:t>Cours: Python | Auteur: TUO N. Ismaël Maurice 
+</a:t>
+            </a:r>
+          </a:p>
+        </p:txBody>
+      </p:sp>
+      <p:sp>
+        <p:nvSpPr>
+          <p:cNvPr id="5" name="Espace réservé du numéro de diapositive 4">
+            <a:extLst>
+              <a:ext uri="{FF2B5EF4-FFF2-40B4-BE49-F238E27FC236}">
+                <a16:creationId xmlns:a16="http://schemas.microsoft.com/office/drawing/2014/main" id="{CE50FB16-F89F-D7CA-C6AA-CFC075094990}"/>
+              </a:ext>
+            </a:extLst>
+          </p:cNvPr>
+          <p:cNvSpPr>
+            <a:spLocks noGrp="1"/>
+          </p:cNvSpPr>
+          <p:nvPr>
+            <p:ph type="sldNum" sz="quarter" idx="12"/>
+          </p:nvPr>
+        </p:nvSpPr>
+        <p:spPr/>
+        <p:txBody>
+          <a:bodyPr/>
+          <a:lstStyle/>
+          <a:p>
+            <a:fld id="{B8C3BB88-DD29-4D42-B62E-D7D541DB4348}" type="slidenum">
+              <a:rPr lang="fr-FR" smtClean="0"/>
+              <a:t>14</a:t>
+            </a:fld>
+            <a:endParaRPr lang="fr-FR"/>
+          </a:p>
+        </p:txBody>
+      </p:sp>
+      <p:sp>
+        <p:nvSpPr>
+          <p:cNvPr id="6" name="ZoneTexte 5">
+            <a:extLst>
+              <a:ext uri="{FF2B5EF4-FFF2-40B4-BE49-F238E27FC236}">
+                <a16:creationId xmlns:a16="http://schemas.microsoft.com/office/drawing/2014/main" id="{84F10693-2FE8-EFC8-8DB6-84BFD181D260}"/>
+              </a:ext>
+            </a:extLst>
+          </p:cNvPr>
+          <p:cNvSpPr txBox="1"/>
+          <p:nvPr/>
+        </p:nvSpPr>
+        <p:spPr>
+          <a:xfrm>
+            <a:off x="397564" y="218526"/>
+            <a:ext cx="5052621" cy="461665"/>
+          </a:xfrm>
+          <a:prstGeom prst="rect">
+            <a:avLst/>
+          </a:prstGeom>
+          <a:noFill/>
+        </p:spPr>
+        <p:txBody>
+          <a:bodyPr wrap="square" rtlCol="0">
+            <a:spAutoFit/>
+          </a:bodyPr>
+          <a:lstStyle/>
+          <a:p>
+            <a:r>
+              <a:rPr lang="fr-FR" sz="2400" dirty="0">
+                <a:latin typeface="Times New Roman" panose="02020603050405020304" pitchFamily="18" charset="0"/>
+                <a:cs typeface="Times New Roman" panose="02020603050405020304" pitchFamily="18" charset="0"/>
+              </a:rPr>
+              <a:t>Exercices</a:t>
+            </a:r>
+          </a:p>
+        </p:txBody>
+      </p:sp>
+      <p:cxnSp>
+        <p:nvCxnSpPr>
+          <p:cNvPr id="3" name="Connecteur droit 2">
+            <a:extLst>
+              <a:ext uri="{FF2B5EF4-FFF2-40B4-BE49-F238E27FC236}">
+                <a16:creationId xmlns:a16="http://schemas.microsoft.com/office/drawing/2014/main" id="{6AC8021D-4898-08B9-18A0-60AC71EF613E}"/>
+              </a:ext>
+            </a:extLst>
+          </p:cNvPr>
+          <p:cNvCxnSpPr>
+            <a:cxnSpLocks/>
+          </p:cNvCxnSpPr>
+          <p:nvPr/>
+        </p:nvCxnSpPr>
+        <p:spPr>
+          <a:xfrm>
+            <a:off x="500932" y="680191"/>
+            <a:ext cx="11178450" cy="0"/>
+          </a:xfrm>
+          <a:prstGeom prst="line">
+            <a:avLst/>
+          </a:prstGeom>
+          <a:ln/>
+        </p:spPr>
+        <p:style>
+          <a:lnRef idx="3">
+            <a:schemeClr val="accent3"/>
+          </a:lnRef>
+          <a:fillRef idx="0">
+            <a:schemeClr val="accent3"/>
+          </a:fillRef>
+          <a:effectRef idx="2">
+            <a:schemeClr val="accent3"/>
+          </a:effectRef>
+          <a:fontRef idx="minor">
+            <a:schemeClr val="tx1"/>
+          </a:fontRef>
+        </p:style>
+      </p:cxnSp>
+      <p:sp>
+        <p:nvSpPr>
+          <p:cNvPr id="2" name="ZoneTexte 1">
+            <a:extLst>
+              <a:ext uri="{FF2B5EF4-FFF2-40B4-BE49-F238E27FC236}">
+                <a16:creationId xmlns:a16="http://schemas.microsoft.com/office/drawing/2014/main" id="{30762B68-20AD-E048-3AB2-67EF1C3DE0A6}"/>
+              </a:ext>
+            </a:extLst>
+          </p:cNvPr>
+          <p:cNvSpPr txBox="1"/>
+          <p:nvPr/>
+        </p:nvSpPr>
+        <p:spPr>
+          <a:xfrm>
+            <a:off x="397564" y="733774"/>
+            <a:ext cx="11569148" cy="400110"/>
+          </a:xfrm>
+          <a:prstGeom prst="rect">
+            <a:avLst/>
+          </a:prstGeom>
+          <a:noFill/>
+        </p:spPr>
+        <p:txBody>
+          <a:bodyPr wrap="square" rtlCol="0">
+            <a:spAutoFit/>
+          </a:bodyPr>
+          <a:lstStyle/>
+          <a:p>
+            <a:r>
+              <a:rPr lang="fr-FR" sz="2000" b="1" u="sng" dirty="0">
+                <a:latin typeface="Times New Roman" panose="02020603050405020304" pitchFamily="18" charset="0"/>
+                <a:cs typeface="Times New Roman" panose="02020603050405020304" pitchFamily="18" charset="0"/>
+              </a:rPr>
+              <a:t>Exercice 3</a:t>
+            </a:r>
+          </a:p>
+        </p:txBody>
+      </p:sp>
+      <p:sp>
+        <p:nvSpPr>
+          <p:cNvPr id="7" name="ZoneTexte 6">
+            <a:extLst>
+              <a:ext uri="{FF2B5EF4-FFF2-40B4-BE49-F238E27FC236}">
+                <a16:creationId xmlns:a16="http://schemas.microsoft.com/office/drawing/2014/main" id="{FCD1A551-D5DA-D79A-72E1-60BA3F6C6A7A}"/>
+              </a:ext>
+            </a:extLst>
+          </p:cNvPr>
+          <p:cNvSpPr txBox="1"/>
+          <p:nvPr/>
+        </p:nvSpPr>
+        <p:spPr>
+          <a:xfrm>
+            <a:off x="397564" y="1126289"/>
+            <a:ext cx="11569148" cy="1015663"/>
+          </a:xfrm>
+          <a:prstGeom prst="rect">
+            <a:avLst/>
+          </a:prstGeom>
+          <a:noFill/>
+        </p:spPr>
+        <p:txBody>
+          <a:bodyPr wrap="square" rtlCol="0">
+            <a:spAutoFit/>
+          </a:bodyPr>
+          <a:lstStyle/>
+          <a:p>
+            <a:r>
+              <a:rPr lang="fr-FR" sz="2000" dirty="0">
+                <a:latin typeface="Times New Roman" panose="02020603050405020304" pitchFamily="18" charset="0"/>
+                <a:cs typeface="Times New Roman" panose="02020603050405020304" pitchFamily="18" charset="0"/>
+              </a:rPr>
+              <a:t>Définir une fonction </a:t>
+            </a:r>
+            <a:r>
+              <a:rPr lang="fr-FR" sz="2000" b="1" dirty="0" err="1">
+                <a:latin typeface="Times New Roman" panose="02020603050405020304" pitchFamily="18" charset="0"/>
+                <a:cs typeface="Times New Roman" panose="02020603050405020304" pitchFamily="18" charset="0"/>
+              </a:rPr>
+              <a:t>nomDuMois</a:t>
+            </a:r>
+            <a:r>
+              <a:rPr lang="fr-FR" sz="2000" b="1" dirty="0">
+                <a:latin typeface="Times New Roman" panose="02020603050405020304" pitchFamily="18" charset="0"/>
+                <a:cs typeface="Times New Roman" panose="02020603050405020304" pitchFamily="18" charset="0"/>
+              </a:rPr>
+              <a:t>(n) </a:t>
+            </a:r>
+            <a:r>
+              <a:rPr lang="fr-FR" sz="2000" dirty="0">
+                <a:latin typeface="Times New Roman" panose="02020603050405020304" pitchFamily="18" charset="0"/>
+                <a:cs typeface="Times New Roman" panose="02020603050405020304" pitchFamily="18" charset="0"/>
+              </a:rPr>
+              <a:t>qui renvoie le nom du nième mois de l’année. Par exemple, l’exécution de </a:t>
+            </a:r>
+            <a:r>
+              <a:rPr lang="fr-FR" sz="2000" b="1" dirty="0" err="1">
+                <a:latin typeface="Times New Roman" panose="02020603050405020304" pitchFamily="18" charset="0"/>
+                <a:cs typeface="Times New Roman" panose="02020603050405020304" pitchFamily="18" charset="0"/>
+              </a:rPr>
+              <a:t>nomDuMois</a:t>
+            </a:r>
+            <a:r>
+              <a:rPr lang="fr-FR" sz="2000" b="1" dirty="0">
+                <a:latin typeface="Times New Roman" panose="02020603050405020304" pitchFamily="18" charset="0"/>
+                <a:cs typeface="Times New Roman" panose="02020603050405020304" pitchFamily="18" charset="0"/>
+              </a:rPr>
+              <a:t>(4) </a:t>
+            </a:r>
+            <a:r>
+              <a:rPr lang="fr-FR" sz="2000" dirty="0">
+                <a:latin typeface="Times New Roman" panose="02020603050405020304" pitchFamily="18" charset="0"/>
+                <a:cs typeface="Times New Roman" panose="02020603050405020304" pitchFamily="18" charset="0"/>
+              </a:rPr>
+              <a:t>doit renvoyer: </a:t>
+            </a:r>
+            <a:r>
+              <a:rPr lang="fr-FR" sz="2000" b="1" dirty="0">
+                <a:latin typeface="Times New Roman" panose="02020603050405020304" pitchFamily="18" charset="0"/>
+                <a:cs typeface="Times New Roman" panose="02020603050405020304" pitchFamily="18" charset="0"/>
+              </a:rPr>
+              <a:t>Avril.</a:t>
+            </a:r>
+          </a:p>
+          <a:p>
+            <a:r>
+              <a:rPr lang="fr-FR" sz="2000" dirty="0">
+                <a:latin typeface="Times New Roman" panose="02020603050405020304" pitchFamily="18" charset="0"/>
+                <a:cs typeface="Times New Roman" panose="02020603050405020304" pitchFamily="18" charset="0"/>
+              </a:rPr>
+              <a:t>Ecrire un programme qui demande à l’utilisateur le numéro d’un mois entre 1 et 12 et afficher le nom du mois. </a:t>
+            </a:r>
+          </a:p>
+        </p:txBody>
+      </p:sp>
+      <p:sp>
+        <p:nvSpPr>
+          <p:cNvPr id="10" name="ZoneTexte 9">
+            <a:extLst>
+              <a:ext uri="{FF2B5EF4-FFF2-40B4-BE49-F238E27FC236}">
+                <a16:creationId xmlns:a16="http://schemas.microsoft.com/office/drawing/2014/main" id="{60220270-ECDE-27C4-6E68-F415271D9604}"/>
+              </a:ext>
+            </a:extLst>
+          </p:cNvPr>
+          <p:cNvSpPr txBox="1"/>
+          <p:nvPr/>
+        </p:nvSpPr>
+        <p:spPr>
+          <a:xfrm>
+            <a:off x="397564" y="2167114"/>
+            <a:ext cx="11569148" cy="400110"/>
+          </a:xfrm>
+          <a:prstGeom prst="rect">
+            <a:avLst/>
+          </a:prstGeom>
+          <a:noFill/>
+        </p:spPr>
+        <p:txBody>
+          <a:bodyPr wrap="square" rtlCol="0">
+            <a:spAutoFit/>
+          </a:bodyPr>
+          <a:lstStyle/>
+          <a:p>
+            <a:r>
+              <a:rPr lang="fr-FR" sz="2000" b="1" u="sng" dirty="0">
+                <a:latin typeface="Times New Roman" panose="02020603050405020304" pitchFamily="18" charset="0"/>
+                <a:cs typeface="Times New Roman" panose="02020603050405020304" pitchFamily="18" charset="0"/>
+              </a:rPr>
+              <a:t>Exercice 4</a:t>
+            </a:r>
+          </a:p>
+        </p:txBody>
+      </p:sp>
+      <p:sp>
+        <p:nvSpPr>
+          <p:cNvPr id="11" name="ZoneTexte 10">
+            <a:extLst>
+              <a:ext uri="{FF2B5EF4-FFF2-40B4-BE49-F238E27FC236}">
+                <a16:creationId xmlns:a16="http://schemas.microsoft.com/office/drawing/2014/main" id="{2465370F-D6C4-50C5-D9F0-E7309C29AD6B}"/>
+              </a:ext>
+            </a:extLst>
+          </p:cNvPr>
+          <p:cNvSpPr txBox="1"/>
+          <p:nvPr/>
+        </p:nvSpPr>
+        <p:spPr>
+          <a:xfrm>
+            <a:off x="397564" y="2592386"/>
+            <a:ext cx="11569148" cy="1015663"/>
+          </a:xfrm>
+          <a:prstGeom prst="rect">
+            <a:avLst/>
+          </a:prstGeom>
+          <a:noFill/>
+        </p:spPr>
+        <p:txBody>
+          <a:bodyPr wrap="square" rtlCol="0">
+            <a:spAutoFit/>
+          </a:bodyPr>
+          <a:lstStyle/>
+          <a:p>
+            <a:r>
+              <a:rPr lang="fr-FR" sz="2000" dirty="0">
+                <a:latin typeface="Times New Roman" panose="02020603050405020304" pitchFamily="18" charset="0"/>
+                <a:cs typeface="Times New Roman" panose="02020603050405020304" pitchFamily="18" charset="0"/>
+              </a:rPr>
+              <a:t>Définir une fonction </a:t>
+            </a:r>
+            <a:r>
+              <a:rPr lang="fr-FR" sz="2000" b="1" dirty="0" err="1">
+                <a:latin typeface="Times New Roman" panose="02020603050405020304" pitchFamily="18" charset="0"/>
+                <a:cs typeface="Times New Roman" panose="02020603050405020304" pitchFamily="18" charset="0"/>
+              </a:rPr>
+              <a:t>compteurMots</a:t>
+            </a:r>
+            <a:r>
+              <a:rPr lang="fr-FR" sz="2000" b="1" dirty="0">
+                <a:latin typeface="Times New Roman" panose="02020603050405020304" pitchFamily="18" charset="0"/>
+                <a:cs typeface="Times New Roman" panose="02020603050405020304" pitchFamily="18" charset="0"/>
+              </a:rPr>
+              <a:t>(phrase), </a:t>
+            </a:r>
+            <a:r>
+              <a:rPr lang="fr-FR" sz="2000" dirty="0">
+                <a:latin typeface="Times New Roman" panose="02020603050405020304" pitchFamily="18" charset="0"/>
+                <a:cs typeface="Times New Roman" panose="02020603050405020304" pitchFamily="18" charset="0"/>
+              </a:rPr>
+              <a:t>qui renvoie le nombre de mots contenus dans une phrase.</a:t>
+            </a:r>
+          </a:p>
+          <a:p>
+            <a:r>
+              <a:rPr lang="fr-FR" sz="2000" dirty="0">
+                <a:latin typeface="Times New Roman" panose="02020603050405020304" pitchFamily="18" charset="0"/>
+                <a:cs typeface="Times New Roman" panose="02020603050405020304" pitchFamily="18" charset="0"/>
+              </a:rPr>
+              <a:t>Ecrire un programme qui va demander une phrase à l’utilisateur et afficher le nombre de mots contenus dans la phrase.</a:t>
+            </a:r>
+          </a:p>
+        </p:txBody>
+      </p:sp>
+      <p:sp>
+        <p:nvSpPr>
+          <p:cNvPr id="12" name="ZoneTexte 11">
+            <a:extLst>
+              <a:ext uri="{FF2B5EF4-FFF2-40B4-BE49-F238E27FC236}">
+                <a16:creationId xmlns:a16="http://schemas.microsoft.com/office/drawing/2014/main" id="{B11DD3E0-F2A9-C04C-6934-F8960472A036}"/>
+              </a:ext>
+            </a:extLst>
+          </p:cNvPr>
+          <p:cNvSpPr txBox="1"/>
+          <p:nvPr/>
+        </p:nvSpPr>
+        <p:spPr>
+          <a:xfrm>
+            <a:off x="397564" y="3689945"/>
+            <a:ext cx="11569148" cy="400110"/>
+          </a:xfrm>
+          <a:prstGeom prst="rect">
+            <a:avLst/>
+          </a:prstGeom>
+          <a:noFill/>
+        </p:spPr>
+        <p:txBody>
+          <a:bodyPr wrap="square" rtlCol="0">
+            <a:spAutoFit/>
+          </a:bodyPr>
+          <a:lstStyle/>
+          <a:p>
+            <a:r>
+              <a:rPr lang="fr-FR" sz="2000" b="1" u="sng" dirty="0">
+                <a:latin typeface="Times New Roman" panose="02020603050405020304" pitchFamily="18" charset="0"/>
+                <a:cs typeface="Times New Roman" panose="02020603050405020304" pitchFamily="18" charset="0"/>
+              </a:rPr>
+              <a:t>Exercice 5</a:t>
+            </a:r>
+          </a:p>
+        </p:txBody>
+      </p:sp>
+      <p:sp>
+        <p:nvSpPr>
+          <p:cNvPr id="13" name="ZoneTexte 12">
+            <a:extLst>
+              <a:ext uri="{FF2B5EF4-FFF2-40B4-BE49-F238E27FC236}">
+                <a16:creationId xmlns:a16="http://schemas.microsoft.com/office/drawing/2014/main" id="{EE2FB13B-DCD8-165A-4F3F-9CA9A2E44142}"/>
+              </a:ext>
+            </a:extLst>
+          </p:cNvPr>
+          <p:cNvSpPr txBox="1"/>
+          <p:nvPr/>
+        </p:nvSpPr>
+        <p:spPr>
+          <a:xfrm>
+            <a:off x="397564" y="4091183"/>
+            <a:ext cx="11569148" cy="1323439"/>
+          </a:xfrm>
+          <a:prstGeom prst="rect">
+            <a:avLst/>
+          </a:prstGeom>
+          <a:noFill/>
+        </p:spPr>
+        <p:txBody>
+          <a:bodyPr wrap="square" rtlCol="0">
+            <a:spAutoFit/>
+          </a:bodyPr>
+          <a:lstStyle/>
+          <a:p>
+            <a:r>
+              <a:rPr lang="fr-FR" sz="2000" dirty="0">
+                <a:latin typeface="Times New Roman" panose="02020603050405020304" pitchFamily="18" charset="0"/>
+                <a:cs typeface="Times New Roman" panose="02020603050405020304" pitchFamily="18" charset="0"/>
+              </a:rPr>
+              <a:t>Définir une méthode </a:t>
+            </a:r>
+            <a:r>
+              <a:rPr lang="fr-FR" sz="2000" b="1" dirty="0" err="1">
+                <a:latin typeface="Times New Roman" panose="02020603050405020304" pitchFamily="18" charset="0"/>
+                <a:cs typeface="Times New Roman" panose="02020603050405020304" pitchFamily="18" charset="0"/>
+              </a:rPr>
+              <a:t>tableMultiplication</a:t>
+            </a:r>
+            <a:r>
+              <a:rPr lang="fr-FR" sz="2000" b="1" dirty="0">
+                <a:latin typeface="Times New Roman" panose="02020603050405020304" pitchFamily="18" charset="0"/>
+                <a:cs typeface="Times New Roman" panose="02020603050405020304" pitchFamily="18" charset="0"/>
+              </a:rPr>
+              <a:t>(n) </a:t>
+            </a:r>
+            <a:r>
+              <a:rPr lang="fr-FR" sz="2000" dirty="0">
+                <a:latin typeface="Times New Roman" panose="02020603050405020304" pitchFamily="18" charset="0"/>
+                <a:cs typeface="Times New Roman" panose="02020603050405020304" pitchFamily="18" charset="0"/>
+              </a:rPr>
+              <a:t>qui affiche la table de multiplication de 0 à 10 du nombre n fourni en paramètre.</a:t>
+            </a:r>
+          </a:p>
+          <a:p>
+            <a:r>
+              <a:rPr lang="fr-FR" sz="2000" dirty="0">
+                <a:latin typeface="Times New Roman" panose="02020603050405020304" pitchFamily="18" charset="0"/>
+                <a:cs typeface="Times New Roman" panose="02020603050405020304" pitchFamily="18" charset="0"/>
+              </a:rPr>
+              <a:t>Ecrire un programme qui va demander un nombre à l’utilisateur et afficher la table de multiplication de ce nombre.</a:t>
+            </a:r>
+          </a:p>
+        </p:txBody>
+      </p:sp>
+      <p:sp>
+        <p:nvSpPr>
+          <p:cNvPr id="14" name="ZoneTexte 13">
+            <a:extLst>
+              <a:ext uri="{FF2B5EF4-FFF2-40B4-BE49-F238E27FC236}">
+                <a16:creationId xmlns:a16="http://schemas.microsoft.com/office/drawing/2014/main" id="{E20CB38B-CA84-DB9B-DFA7-796D6494D659}"/>
+              </a:ext>
+            </a:extLst>
+          </p:cNvPr>
+          <p:cNvSpPr txBox="1"/>
+          <p:nvPr/>
+        </p:nvSpPr>
+        <p:spPr>
+          <a:xfrm>
+            <a:off x="299889" y="5446846"/>
+            <a:ext cx="11764497" cy="707886"/>
+          </a:xfrm>
+          <a:prstGeom prst="rect">
+            <a:avLst/>
+          </a:prstGeom>
+          <a:noFill/>
+        </p:spPr>
+        <p:txBody>
+          <a:bodyPr wrap="square" rtlCol="0">
+            <a:spAutoFit/>
+          </a:bodyPr>
+          <a:lstStyle/>
+          <a:p>
+            <a:r>
+              <a:rPr lang="fr-FR" sz="2000" b="1" dirty="0">
+                <a:latin typeface="Times New Roman" panose="02020603050405020304" pitchFamily="18" charset="0"/>
+                <a:cs typeface="Times New Roman" panose="02020603050405020304" pitchFamily="18" charset="0"/>
+              </a:rPr>
+              <a:t>Dans tous les exercices précédents on considère que l’utilisateur fournit un nombre. Pas besoin de vérifier si la saisie est un nombre ou pas.</a:t>
+            </a:r>
+          </a:p>
+        </p:txBody>
+      </p:sp>
+    </p:spTree>
+    <p:extLst>
+      <p:ext uri="{BB962C8B-B14F-4D97-AF65-F5344CB8AC3E}">
+        <p14:creationId xmlns:p14="http://schemas.microsoft.com/office/powerpoint/2010/main" val="2656507146"/>
+      </p:ext>
+    </p:extLst>
+  </p:cSld>
+  <p:clrMapOvr>
+    <a:masterClrMapping/>
+  </p:clrMapOvr>
+</p:sld>
+</file>
+
+<file path=ppt/slides/slide15.xml><?xml version="1.0" encoding="utf-8"?>
+<p:sld xmlns:a="http://schemas.openxmlformats.org/drawingml/2006/main" xmlns:r="http://schemas.openxmlformats.org/officeDocument/2006/relationships" xmlns:p="http://schemas.openxmlformats.org/presentationml/2006/main">
+  <p:cSld>
+    <p:spTree>
+      <p:nvGrpSpPr>
+        <p:cNvPr id="1" name=""/>
+        <p:cNvGrpSpPr/>
+        <p:nvPr/>
+      </p:nvGrpSpPr>
+      <p:grpSpPr>
+        <a:xfrm>
+          <a:off x="0" y="0"/>
+          <a:ext cx="0" cy="0"/>
+          <a:chOff x="0" y="0"/>
+          <a:chExt cx="0" cy="0"/>
+        </a:xfrm>
+      </p:grpSpPr>
+      <p:sp>
+        <p:nvSpPr>
+          <p:cNvPr id="4" name="Espace réservé du pied de page 3">
+            <a:extLst>
+              <a:ext uri="{FF2B5EF4-FFF2-40B4-BE49-F238E27FC236}">
+                <a16:creationId xmlns:a16="http://schemas.microsoft.com/office/drawing/2014/main" id="{8FEEC940-4BFF-956C-713A-1CE73C436B6F}"/>
+              </a:ext>
+            </a:extLst>
+          </p:cNvPr>
+          <p:cNvSpPr>
+            <a:spLocks noGrp="1"/>
+          </p:cNvSpPr>
+          <p:nvPr>
+            <p:ph type="ftr" sz="quarter" idx="11"/>
+          </p:nvPr>
+        </p:nvSpPr>
+        <p:spPr/>
+        <p:txBody>
+          <a:bodyPr/>
+          <a:lstStyle/>
+          <a:p>
+            <a:r>
+              <a:rPr lang="fr-FR"/>
+              <a:t>Cours: Python | Auteur: TUO N. Ismaël Maurice 
+</a:t>
+            </a:r>
+          </a:p>
+        </p:txBody>
+      </p:sp>
+      <p:sp>
+        <p:nvSpPr>
+          <p:cNvPr id="5" name="Espace réservé du numéro de diapositive 4">
+            <a:extLst>
+              <a:ext uri="{FF2B5EF4-FFF2-40B4-BE49-F238E27FC236}">
+                <a16:creationId xmlns:a16="http://schemas.microsoft.com/office/drawing/2014/main" id="{CE50FB16-F89F-D7CA-C6AA-CFC075094990}"/>
+              </a:ext>
+            </a:extLst>
+          </p:cNvPr>
+          <p:cNvSpPr>
+            <a:spLocks noGrp="1"/>
+          </p:cNvSpPr>
+          <p:nvPr>
+            <p:ph type="sldNum" sz="quarter" idx="12"/>
+          </p:nvPr>
+        </p:nvSpPr>
+        <p:spPr/>
+        <p:txBody>
+          <a:bodyPr/>
+          <a:lstStyle/>
+          <a:p>
+            <a:fld id="{B8C3BB88-DD29-4D42-B62E-D7D541DB4348}" type="slidenum">
+              <a:rPr lang="fr-FR" smtClean="0"/>
+              <a:t>15</a:t>
+            </a:fld>
+            <a:endParaRPr lang="fr-FR"/>
+          </a:p>
+        </p:txBody>
+      </p:sp>
+      <p:sp>
+        <p:nvSpPr>
+          <p:cNvPr id="6" name="ZoneTexte 5">
+            <a:extLst>
+              <a:ext uri="{FF2B5EF4-FFF2-40B4-BE49-F238E27FC236}">
+                <a16:creationId xmlns:a16="http://schemas.microsoft.com/office/drawing/2014/main" id="{84F10693-2FE8-EFC8-8DB6-84BFD181D260}"/>
+              </a:ext>
+            </a:extLst>
+          </p:cNvPr>
+          <p:cNvSpPr txBox="1"/>
+          <p:nvPr/>
+        </p:nvSpPr>
+        <p:spPr>
+          <a:xfrm>
+            <a:off x="397564" y="218526"/>
+            <a:ext cx="5052621" cy="461665"/>
+          </a:xfrm>
+          <a:prstGeom prst="rect">
+            <a:avLst/>
+          </a:prstGeom>
+          <a:noFill/>
+        </p:spPr>
+        <p:txBody>
+          <a:bodyPr wrap="square" rtlCol="0">
+            <a:spAutoFit/>
+          </a:bodyPr>
+          <a:lstStyle/>
+          <a:p>
+            <a:r>
+              <a:rPr lang="fr-FR" sz="2400" dirty="0">
+                <a:latin typeface="Times New Roman" panose="02020603050405020304" pitchFamily="18" charset="0"/>
+                <a:cs typeface="Times New Roman" panose="02020603050405020304" pitchFamily="18" charset="0"/>
+              </a:rPr>
+              <a:t>Exercices</a:t>
+            </a:r>
+          </a:p>
+        </p:txBody>
+      </p:sp>
+      <p:cxnSp>
+        <p:nvCxnSpPr>
+          <p:cNvPr id="3" name="Connecteur droit 2">
+            <a:extLst>
+              <a:ext uri="{FF2B5EF4-FFF2-40B4-BE49-F238E27FC236}">
+                <a16:creationId xmlns:a16="http://schemas.microsoft.com/office/drawing/2014/main" id="{6AC8021D-4898-08B9-18A0-60AC71EF613E}"/>
+              </a:ext>
+            </a:extLst>
+          </p:cNvPr>
+          <p:cNvCxnSpPr>
+            <a:cxnSpLocks/>
+          </p:cNvCxnSpPr>
+          <p:nvPr/>
+        </p:nvCxnSpPr>
+        <p:spPr>
+          <a:xfrm>
+            <a:off x="500932" y="680191"/>
+            <a:ext cx="11178450" cy="0"/>
+          </a:xfrm>
+          <a:prstGeom prst="line">
+            <a:avLst/>
+          </a:prstGeom>
+          <a:ln/>
+        </p:spPr>
+        <p:style>
+          <a:lnRef idx="3">
+            <a:schemeClr val="accent3"/>
+          </a:lnRef>
+          <a:fillRef idx="0">
+            <a:schemeClr val="accent3"/>
+          </a:fillRef>
+          <a:effectRef idx="2">
+            <a:schemeClr val="accent3"/>
+          </a:effectRef>
+          <a:fontRef idx="minor">
+            <a:schemeClr val="tx1"/>
+          </a:fontRef>
+        </p:style>
+      </p:cxnSp>
+      <p:sp>
+        <p:nvSpPr>
+          <p:cNvPr id="12" name="ZoneTexte 11">
+            <a:extLst>
+              <a:ext uri="{FF2B5EF4-FFF2-40B4-BE49-F238E27FC236}">
+                <a16:creationId xmlns:a16="http://schemas.microsoft.com/office/drawing/2014/main" id="{B11DD3E0-F2A9-C04C-6934-F8960472A036}"/>
+              </a:ext>
+            </a:extLst>
+          </p:cNvPr>
+          <p:cNvSpPr txBox="1"/>
+          <p:nvPr/>
+        </p:nvSpPr>
+        <p:spPr>
+          <a:xfrm>
+            <a:off x="397564" y="723305"/>
+            <a:ext cx="11569148" cy="400110"/>
+          </a:xfrm>
+          <a:prstGeom prst="rect">
+            <a:avLst/>
+          </a:prstGeom>
+          <a:noFill/>
+        </p:spPr>
+        <p:txBody>
+          <a:bodyPr wrap="square" rtlCol="0">
+            <a:spAutoFit/>
+          </a:bodyPr>
+          <a:lstStyle/>
+          <a:p>
+            <a:r>
+              <a:rPr lang="fr-FR" sz="2000" b="1" u="sng" dirty="0">
+                <a:latin typeface="Times New Roman" panose="02020603050405020304" pitchFamily="18" charset="0"/>
+                <a:cs typeface="Times New Roman" panose="02020603050405020304" pitchFamily="18" charset="0"/>
+              </a:rPr>
+              <a:t>Exercice 6</a:t>
+            </a:r>
+          </a:p>
+        </p:txBody>
+      </p:sp>
+      <p:sp>
+        <p:nvSpPr>
+          <p:cNvPr id="13" name="ZoneTexte 12">
+            <a:extLst>
+              <a:ext uri="{FF2B5EF4-FFF2-40B4-BE49-F238E27FC236}">
+                <a16:creationId xmlns:a16="http://schemas.microsoft.com/office/drawing/2014/main" id="{EE2FB13B-DCD8-165A-4F3F-9CA9A2E44142}"/>
+              </a:ext>
+            </a:extLst>
+          </p:cNvPr>
+          <p:cNvSpPr txBox="1"/>
+          <p:nvPr/>
+        </p:nvSpPr>
+        <p:spPr>
+          <a:xfrm>
+            <a:off x="317269" y="1143299"/>
+            <a:ext cx="11569148" cy="1631216"/>
+          </a:xfrm>
+          <a:prstGeom prst="rect">
+            <a:avLst/>
+          </a:prstGeom>
+          <a:noFill/>
+        </p:spPr>
+        <p:txBody>
+          <a:bodyPr wrap="square" rtlCol="0">
+            <a:spAutoFit/>
+          </a:bodyPr>
+          <a:lstStyle/>
+          <a:p>
+            <a:r>
+              <a:rPr lang="fr-FR" sz="2000" dirty="0">
+                <a:latin typeface="Times New Roman" panose="02020603050405020304" pitchFamily="18" charset="0"/>
+                <a:cs typeface="Times New Roman" panose="02020603050405020304" pitchFamily="18" charset="0"/>
+              </a:rPr>
+              <a:t>Définir une méthode </a:t>
+            </a:r>
+            <a:r>
+              <a:rPr lang="fr-FR" sz="2000" b="1" dirty="0" err="1">
+                <a:latin typeface="Times New Roman" panose="02020603050405020304" pitchFamily="18" charset="0"/>
+                <a:cs typeface="Times New Roman" panose="02020603050405020304" pitchFamily="18" charset="0"/>
+              </a:rPr>
+              <a:t>tableMultiplication</a:t>
+            </a:r>
+            <a:r>
+              <a:rPr lang="fr-FR" sz="2000" b="1" dirty="0">
+                <a:latin typeface="Times New Roman" panose="02020603050405020304" pitchFamily="18" charset="0"/>
+                <a:cs typeface="Times New Roman" panose="02020603050405020304" pitchFamily="18" charset="0"/>
+              </a:rPr>
+              <a:t>(nbre, fin) </a:t>
+            </a:r>
+            <a:r>
+              <a:rPr lang="fr-FR" sz="2000" dirty="0">
+                <a:latin typeface="Times New Roman" panose="02020603050405020304" pitchFamily="18" charset="0"/>
+                <a:cs typeface="Times New Roman" panose="02020603050405020304" pitchFamily="18" charset="0"/>
+              </a:rPr>
+              <a:t>qui affiche la table de multiplication du nombre nbre de 0 au nombre fin fourni en paramètre. Par exemple </a:t>
+            </a:r>
+            <a:r>
+              <a:rPr lang="fr-FR" sz="2000" b="1" dirty="0" err="1">
+                <a:latin typeface="Times New Roman" panose="02020603050405020304" pitchFamily="18" charset="0"/>
+                <a:cs typeface="Times New Roman" panose="02020603050405020304" pitchFamily="18" charset="0"/>
+              </a:rPr>
+              <a:t>tableMultiplication</a:t>
+            </a:r>
+            <a:r>
+              <a:rPr lang="fr-FR" sz="2000" b="1" dirty="0">
+                <a:latin typeface="Times New Roman" panose="02020603050405020304" pitchFamily="18" charset="0"/>
+                <a:cs typeface="Times New Roman" panose="02020603050405020304" pitchFamily="18" charset="0"/>
+              </a:rPr>
+              <a:t>(7, 20) </a:t>
+            </a:r>
+            <a:r>
+              <a:rPr lang="fr-FR" sz="2000" dirty="0">
+                <a:latin typeface="Times New Roman" panose="02020603050405020304" pitchFamily="18" charset="0"/>
+                <a:cs typeface="Times New Roman" panose="02020603050405020304" pitchFamily="18" charset="0"/>
+              </a:rPr>
+              <a:t>doit afficher la table de 7 de 0 à 20.</a:t>
+            </a:r>
+            <a:r>
+              <a:rPr lang="fr-FR" sz="2000" b="1" dirty="0">
+                <a:latin typeface="Times New Roman" panose="02020603050405020304" pitchFamily="18" charset="0"/>
+                <a:cs typeface="Times New Roman" panose="02020603050405020304" pitchFamily="18" charset="0"/>
+              </a:rPr>
+              <a:t> </a:t>
+            </a:r>
+            <a:endParaRPr lang="fr-FR" sz="2000" dirty="0">
+              <a:latin typeface="Times New Roman" panose="02020603050405020304" pitchFamily="18" charset="0"/>
+              <a:cs typeface="Times New Roman" panose="02020603050405020304" pitchFamily="18" charset="0"/>
+            </a:endParaRPr>
+          </a:p>
+          <a:p>
+            <a:r>
+              <a:rPr lang="fr-FR" sz="2000" dirty="0">
+                <a:latin typeface="Times New Roman" panose="02020603050405020304" pitchFamily="18" charset="0"/>
+                <a:cs typeface="Times New Roman" panose="02020603050405020304" pitchFamily="18" charset="0"/>
+              </a:rPr>
+              <a:t>Ecrire un programme qui va demander un nombre à l’utilisateur et ensuite demander la fin de la table de multiplication (attention ici il faut veiller à ce que la limite soit supérieure au nombre nbre et positif).</a:t>
+            </a:r>
+          </a:p>
+          <a:p>
+            <a:r>
+              <a:rPr lang="fr-FR" sz="2000" dirty="0">
+                <a:latin typeface="Times New Roman" panose="02020603050405020304" pitchFamily="18" charset="0"/>
+                <a:cs typeface="Times New Roman" panose="02020603050405020304" pitchFamily="18" charset="0"/>
+              </a:rPr>
+              <a:t>Le programme doit appeler la méthode pour afficher la table de multiplication.</a:t>
+            </a:r>
+          </a:p>
+        </p:txBody>
+      </p:sp>
+      <p:sp>
+        <p:nvSpPr>
+          <p:cNvPr id="8" name="ZoneTexte 7">
+            <a:extLst>
+              <a:ext uri="{FF2B5EF4-FFF2-40B4-BE49-F238E27FC236}">
+                <a16:creationId xmlns:a16="http://schemas.microsoft.com/office/drawing/2014/main" id="{EB032A17-4451-B99F-ABFE-13F9F5C9B8B6}"/>
+              </a:ext>
+            </a:extLst>
+          </p:cNvPr>
+          <p:cNvSpPr txBox="1"/>
+          <p:nvPr/>
+        </p:nvSpPr>
+        <p:spPr>
+          <a:xfrm>
+            <a:off x="317269" y="2912276"/>
+            <a:ext cx="11569148" cy="400110"/>
+          </a:xfrm>
+          <a:prstGeom prst="rect">
+            <a:avLst/>
+          </a:prstGeom>
+          <a:noFill/>
+        </p:spPr>
+        <p:txBody>
+          <a:bodyPr wrap="square" rtlCol="0">
+            <a:spAutoFit/>
+          </a:bodyPr>
+          <a:lstStyle/>
+          <a:p>
+            <a:r>
+              <a:rPr lang="fr-FR" sz="2000" b="1" u="sng" dirty="0">
+                <a:latin typeface="Times New Roman" panose="02020603050405020304" pitchFamily="18" charset="0"/>
+                <a:cs typeface="Times New Roman" panose="02020603050405020304" pitchFamily="18" charset="0"/>
+              </a:rPr>
+              <a:t>Exercice 7</a:t>
+            </a:r>
+          </a:p>
+        </p:txBody>
+      </p:sp>
+      <p:sp>
+        <p:nvSpPr>
+          <p:cNvPr id="9" name="ZoneTexte 8">
+            <a:extLst>
+              <a:ext uri="{FF2B5EF4-FFF2-40B4-BE49-F238E27FC236}">
+                <a16:creationId xmlns:a16="http://schemas.microsoft.com/office/drawing/2014/main" id="{95B49699-996F-96CB-6EDA-0C2CECAD46E3}"/>
+              </a:ext>
+            </a:extLst>
+          </p:cNvPr>
+          <p:cNvSpPr txBox="1"/>
+          <p:nvPr/>
+        </p:nvSpPr>
+        <p:spPr>
+          <a:xfrm>
+            <a:off x="305583" y="3387853"/>
+            <a:ext cx="11569148" cy="2554545"/>
+          </a:xfrm>
+          <a:prstGeom prst="rect">
+            <a:avLst/>
+          </a:prstGeom>
+          <a:noFill/>
+        </p:spPr>
+        <p:txBody>
+          <a:bodyPr wrap="square" rtlCol="0">
+            <a:spAutoFit/>
+          </a:bodyPr>
+          <a:lstStyle/>
+          <a:p>
+            <a:r>
+              <a:rPr lang="fr-FR" sz="2000" dirty="0">
+                <a:latin typeface="Times New Roman" panose="02020603050405020304" pitchFamily="18" charset="0"/>
+                <a:cs typeface="Times New Roman" panose="02020603050405020304" pitchFamily="18" charset="0"/>
+              </a:rPr>
+              <a:t>Définir une méthode </a:t>
+            </a:r>
+            <a:r>
+              <a:rPr lang="fr-FR" sz="2000" b="1" dirty="0" err="1">
+                <a:latin typeface="Times New Roman" panose="02020603050405020304" pitchFamily="18" charset="0"/>
+                <a:cs typeface="Times New Roman" panose="02020603050405020304" pitchFamily="18" charset="0"/>
+              </a:rPr>
+              <a:t>tableMultiplication</a:t>
+            </a:r>
+            <a:r>
+              <a:rPr lang="fr-FR" sz="2000" b="1" dirty="0">
+                <a:latin typeface="Times New Roman" panose="02020603050405020304" pitchFamily="18" charset="0"/>
+                <a:cs typeface="Times New Roman" panose="02020603050405020304" pitchFamily="18" charset="0"/>
+              </a:rPr>
+              <a:t>(nbre, </a:t>
+            </a:r>
+            <a:r>
+              <a:rPr lang="fr-FR" sz="2000" b="1" dirty="0" err="1">
+                <a:latin typeface="Times New Roman" panose="02020603050405020304" pitchFamily="18" charset="0"/>
+                <a:cs typeface="Times New Roman" panose="02020603050405020304" pitchFamily="18" charset="0"/>
+              </a:rPr>
+              <a:t>debt</a:t>
+            </a:r>
+            <a:r>
+              <a:rPr lang="fr-FR" sz="2000" b="1" dirty="0">
+                <a:latin typeface="Times New Roman" panose="02020603050405020304" pitchFamily="18" charset="0"/>
+                <a:cs typeface="Times New Roman" panose="02020603050405020304" pitchFamily="18" charset="0"/>
+              </a:rPr>
+              <a:t>, fin) </a:t>
+            </a:r>
+            <a:r>
+              <a:rPr lang="fr-FR" sz="2000" dirty="0">
+                <a:latin typeface="Times New Roman" panose="02020603050405020304" pitchFamily="18" charset="0"/>
+                <a:cs typeface="Times New Roman" panose="02020603050405020304" pitchFamily="18" charset="0"/>
+              </a:rPr>
+              <a:t>qui affiche la table de multiplication du nombre nbre de </a:t>
+            </a:r>
+            <a:r>
+              <a:rPr lang="fr-FR" sz="2000" dirty="0" err="1">
+                <a:latin typeface="Times New Roman" panose="02020603050405020304" pitchFamily="18" charset="0"/>
+                <a:cs typeface="Times New Roman" panose="02020603050405020304" pitchFamily="18" charset="0"/>
+              </a:rPr>
+              <a:t>debt</a:t>
+            </a:r>
+            <a:r>
+              <a:rPr lang="fr-FR" sz="2000" dirty="0">
+                <a:latin typeface="Times New Roman" panose="02020603050405020304" pitchFamily="18" charset="0"/>
+                <a:cs typeface="Times New Roman" panose="02020603050405020304" pitchFamily="18" charset="0"/>
+              </a:rPr>
+              <a:t> au nombre fin fourni en paramètres. Par exemple </a:t>
+            </a:r>
+            <a:r>
+              <a:rPr lang="fr-FR" sz="2000" b="1" dirty="0" err="1">
+                <a:latin typeface="Times New Roman" panose="02020603050405020304" pitchFamily="18" charset="0"/>
+                <a:cs typeface="Times New Roman" panose="02020603050405020304" pitchFamily="18" charset="0"/>
+              </a:rPr>
+              <a:t>tableMultiplication</a:t>
+            </a:r>
+            <a:r>
+              <a:rPr lang="fr-FR" sz="2000" b="1" dirty="0">
+                <a:latin typeface="Times New Roman" panose="02020603050405020304" pitchFamily="18" charset="0"/>
+                <a:cs typeface="Times New Roman" panose="02020603050405020304" pitchFamily="18" charset="0"/>
+              </a:rPr>
+              <a:t>(7, 2, 20) </a:t>
+            </a:r>
+            <a:r>
+              <a:rPr lang="fr-FR" sz="2000" dirty="0">
+                <a:latin typeface="Times New Roman" panose="02020603050405020304" pitchFamily="18" charset="0"/>
+                <a:cs typeface="Times New Roman" panose="02020603050405020304" pitchFamily="18" charset="0"/>
+              </a:rPr>
+              <a:t>doit afficher la table de 7 de 2 à 20.</a:t>
+            </a:r>
+            <a:r>
+              <a:rPr lang="fr-FR" sz="2000" b="1" dirty="0">
+                <a:latin typeface="Times New Roman" panose="02020603050405020304" pitchFamily="18" charset="0"/>
+                <a:cs typeface="Times New Roman" panose="02020603050405020304" pitchFamily="18" charset="0"/>
+              </a:rPr>
+              <a:t> </a:t>
+            </a:r>
+          </a:p>
+          <a:p>
+            <a:r>
+              <a:rPr lang="fr-FR" sz="2000" dirty="0">
+                <a:latin typeface="Times New Roman" panose="02020603050405020304" pitchFamily="18" charset="0"/>
+                <a:cs typeface="Times New Roman" panose="02020603050405020304" pitchFamily="18" charset="0"/>
+              </a:rPr>
+              <a:t>Les paramètres </a:t>
+            </a:r>
+            <a:r>
+              <a:rPr lang="fr-FR" sz="2000" dirty="0" err="1">
+                <a:latin typeface="Times New Roman" panose="02020603050405020304" pitchFamily="18" charset="0"/>
+                <a:cs typeface="Times New Roman" panose="02020603050405020304" pitchFamily="18" charset="0"/>
+              </a:rPr>
+              <a:t>debt</a:t>
+            </a:r>
+            <a:r>
+              <a:rPr lang="fr-FR" sz="2000" dirty="0">
+                <a:latin typeface="Times New Roman" panose="02020603050405020304" pitchFamily="18" charset="0"/>
+                <a:cs typeface="Times New Roman" panose="02020603050405020304" pitchFamily="18" charset="0"/>
+              </a:rPr>
+              <a:t> et fin sont des paramètres optionnels de valeur par défaut respectivement 0 et 10.</a:t>
+            </a:r>
+          </a:p>
+          <a:p>
+            <a:r>
+              <a:rPr lang="fr-FR" sz="2000" dirty="0">
+                <a:latin typeface="Times New Roman" panose="02020603050405020304" pitchFamily="18" charset="0"/>
+                <a:cs typeface="Times New Roman" panose="02020603050405020304" pitchFamily="18" charset="0"/>
+              </a:rPr>
+              <a:t>Ecrire un programme qui va demander un nombre à l’utilisateur et ensuite demander le début et la fin de la table de multiplication (attention ici il faut veiller à ce que le début et la fin soit positif, que début soit inférieur à fin).</a:t>
+            </a:r>
+          </a:p>
+          <a:p>
+            <a:r>
+              <a:rPr lang="fr-FR" sz="2000" dirty="0">
+                <a:latin typeface="Times New Roman" panose="02020603050405020304" pitchFamily="18" charset="0"/>
+                <a:cs typeface="Times New Roman" panose="02020603050405020304" pitchFamily="18" charset="0"/>
+              </a:rPr>
+              <a:t>Le programme doit appeler la méthode pour afficher la table de multiplication.</a:t>
+            </a:r>
+          </a:p>
+        </p:txBody>
+      </p:sp>
+    </p:spTree>
+    <p:extLst>
+      <p:ext uri="{BB962C8B-B14F-4D97-AF65-F5344CB8AC3E}">
+        <p14:creationId xmlns:p14="http://schemas.microsoft.com/office/powerpoint/2010/main" val="1514737248"/>
+      </p:ext>
+    </p:extLst>
+  </p:cSld>
+  <p:clrMapOvr>
+    <a:masterClrMapping/>
+  </p:clrMapOvr>
+</p:sld>
+</file>
+
+<file path=ppt/slides/slide16.xml><?xml version="1.0" encoding="utf-8"?>
 <p:sld xmlns:a="http://schemas.openxmlformats.org/drawingml/2006/main" xmlns:r="http://schemas.openxmlformats.org/officeDocument/2006/relationships" xmlns:p="http://schemas.openxmlformats.org/presentationml/2006/main">
   <p:cSld>
     <p:spTree>
@@ -7058,7 +8600,7 @@
         <p:spPr>
           <a:xfrm>
             <a:off x="500932" y="912418"/>
-            <a:ext cx="9192515" cy="4154984"/>
+            <a:ext cx="9192515" cy="4524315"/>
           </a:xfrm>
           <a:prstGeom prst="rect">
             <a:avLst/>
@@ -7189,7 +8731,23 @@
                 <a:cs typeface="Times New Roman" panose="02020603050405020304" pitchFamily="18" charset="0"/>
                 <a:hlinkClick r:id="rId8" action="ppaction://hlinksldjump"/>
               </a:rPr>
-              <a:t>Exemple de fonctions avec documentation</a:t>
+              <a:t>Exemple de fonction</a:t>
+            </a:r>
+            <a:r>
+              <a:rPr lang="fr-FR" sz="2400" dirty="0">
+                <a:latin typeface="Times New Roman" panose="02020603050405020304" pitchFamily="18" charset="0"/>
+                <a:cs typeface="Times New Roman" panose="02020603050405020304" pitchFamily="18" charset="0"/>
+                <a:hlinkClick r:id="rId8" action="ppaction://hlinksldjump"/>
+              </a:rPr>
+              <a:t>s</a:t>
+            </a:r>
+            <a:r>
+              <a:rPr lang="fr-FR" sz="2400" dirty="0">
+                <a:latin typeface="Times New Roman" panose="02020603050405020304" pitchFamily="18" charset="0"/>
+                <a:cs typeface="Times New Roman" panose="02020603050405020304" pitchFamily="18" charset="0"/>
+                <a:hlinkClick r:id="rId8" action="ppaction://hlinksldjump"/>
+              </a:rPr>
+              <a:t> avec documentation</a:t>
             </a:r>
             <a:endParaRPr lang="fr-FR" sz="2400" dirty="0">
               <a:latin typeface="Times New Roman" panose="02020603050405020304" pitchFamily="18" charset="0"/>
@@ -7226,6 +8784,24 @@
                 <a:hlinkClick r:id="rId10" action="ppaction://hlinksldjump"/>
               </a:rPr>
               <a:t>Les fonctions lambda</a:t>
+            </a:r>
+            <a:endParaRPr lang="fr-FR" sz="2400" dirty="0">
+              <a:latin typeface="Times New Roman" panose="02020603050405020304" pitchFamily="18" charset="0"/>
+              <a:cs typeface="Times New Roman" panose="02020603050405020304" pitchFamily="18" charset="0"/>
+            </a:endParaRPr>
+          </a:p>
+          <a:p>
+            <a:pPr marL="342900" indent="-342900">
+              <a:buFont typeface="+mj-lt"/>
+              <a:buAutoNum type="arabicPeriod"/>
+            </a:pPr>
+            <a:r>
+              <a:rPr lang="fr-FR" sz="2400" dirty="0">
+                <a:latin typeface="Times New Roman" panose="02020603050405020304" pitchFamily="18" charset="0"/>
+                <a:cs typeface="Times New Roman" panose="02020603050405020304" pitchFamily="18" charset="0"/>
+                <a:hlinkClick r:id="rId11" action="ppaction://hlinksldjump"/>
+              </a:rPr>
+              <a:t>Exercices</a:t>
             </a:r>
             <a:endParaRPr lang="fr-FR" sz="2400" dirty="0">
               <a:latin typeface="Times New Roman" panose="02020603050405020304" pitchFamily="18" charset="0"/>
@@ -7744,7 +9320,7 @@
             </a:r>
             <a:r>
               <a:rPr lang="fr-FR" dirty="0"/>
-              <a:t> (message)</a:t>
+              <a:t>(message)</a:t>
             </a:r>
           </a:p>
         </p:txBody>

</xml_diff>

<commit_message>
Feat(chp9): Correction chapitre 9 sur les listes
</commit_message>
<xml_diff>
--- a/source/Chapitre 5 - Les fonctions.pptx
+++ b/source/Chapitre 5 - Les fonctions.pptx
@@ -130,14 +130,6 @@
 </p:presentation>
 </file>
 
-<file path=ppt/revisionInfo.xml><?xml version="1.0" encoding="utf-8"?>
-<p1510:revInfo xmlns:a="http://schemas.openxmlformats.org/drawingml/2006/main" xmlns:r="http://schemas.openxmlformats.org/officeDocument/2006/relationships" xmlns:p1510="http://schemas.microsoft.com/office/powerpoint/2015/10/main">
-  <p1510:revLst>
-    <p1510:client id="{E7E317F0-1E26-4BB4-BF77-FD59F7E1022E}" v="17" dt="2023-10-01T14:45:23.081"/>
-  </p1510:revLst>
-</p1510:revInfo>
-</file>
-
 <file path=ppt/changesInfos/changesInfo1.xml><?xml version="1.0" encoding="utf-8"?>
 <pc:chgInfo xmlns:a="http://schemas.openxmlformats.org/drawingml/2006/main" xmlns:r="http://schemas.openxmlformats.org/officeDocument/2006/relationships" xmlns:ac="http://schemas.microsoft.com/office/drawing/2013/main/command" xmlns:pc="http://schemas.microsoft.com/office/powerpoint/2013/main/command">
   <pc:docChgLst>
@@ -1774,6 +1766,46 @@
             <ac:spMk id="14" creationId="{F92C4F08-5F88-5ACA-3758-6698A31671F7}"/>
           </ac:spMkLst>
         </pc:spChg>
+      </pc:sldChg>
+    </pc:docChg>
+  </pc:docChgLst>
+  <pc:docChgLst>
+    <pc:chgData name="Ismaël Tuo" userId="fca7baf0e513a1e6" providerId="LiveId" clId="{2CF1F51A-A935-4E34-AE2E-DE56A3D7B47C}"/>
+    <pc:docChg chg="modSld">
+      <pc:chgData name="Ismaël Tuo" userId="fca7baf0e513a1e6" providerId="LiveId" clId="{2CF1F51A-A935-4E34-AE2E-DE56A3D7B47C}" dt="2024-09-14T05:53:05.117" v="4" actId="1076"/>
+      <pc:docMkLst>
+        <pc:docMk/>
+      </pc:docMkLst>
+      <pc:sldChg chg="modSp mod">
+        <pc:chgData name="Ismaël Tuo" userId="fca7baf0e513a1e6" providerId="LiveId" clId="{2CF1F51A-A935-4E34-AE2E-DE56A3D7B47C}" dt="2024-09-14T05:53:05.117" v="4" actId="1076"/>
+        <pc:sldMkLst>
+          <pc:docMk/>
+          <pc:sldMk cId="2563257676" sldId="287"/>
+        </pc:sldMkLst>
+        <pc:spChg chg="mod">
+          <ac:chgData name="Ismaël Tuo" userId="fca7baf0e513a1e6" providerId="LiveId" clId="{2CF1F51A-A935-4E34-AE2E-DE56A3D7B47C}" dt="2024-09-14T05:53:01.606" v="3" actId="1076"/>
+          <ac:spMkLst>
+            <pc:docMk/>
+            <pc:sldMk cId="2563257676" sldId="287"/>
+            <ac:spMk id="20" creationId="{AB7CAFA8-007F-0D1A-6CC5-A37AE9EADE92}"/>
+          </ac:spMkLst>
+        </pc:spChg>
+        <pc:spChg chg="mod">
+          <ac:chgData name="Ismaël Tuo" userId="fca7baf0e513a1e6" providerId="LiveId" clId="{2CF1F51A-A935-4E34-AE2E-DE56A3D7B47C}" dt="2024-09-14T05:52:58.574" v="2" actId="1076"/>
+          <ac:spMkLst>
+            <pc:docMk/>
+            <pc:sldMk cId="2563257676" sldId="287"/>
+            <ac:spMk id="21" creationId="{81F968F3-5442-305D-2EED-2425CAE839E3}"/>
+          </ac:spMkLst>
+        </pc:spChg>
+        <pc:picChg chg="mod">
+          <ac:chgData name="Ismaël Tuo" userId="fca7baf0e513a1e6" providerId="LiveId" clId="{2CF1F51A-A935-4E34-AE2E-DE56A3D7B47C}" dt="2024-09-14T05:53:05.117" v="4" actId="1076"/>
+          <ac:picMkLst>
+            <pc:docMk/>
+            <pc:sldMk cId="2563257676" sldId="287"/>
+            <ac:picMk id="10" creationId="{43D12E3A-A2FC-3E5F-7BB1-D64B6AE0F046}"/>
+          </ac:picMkLst>
+        </pc:picChg>
       </pc:sldChg>
     </pc:docChg>
   </pc:docChgLst>
@@ -1862,7 +1894,7 @@
           <a:p>
             <a:fld id="{5D1B8971-FAD5-A544-A565-5C81831E2E08}" type="datetimeFigureOut">
               <a:rPr lang="fr-FR" smtClean="0"/>
-              <a:t>12/11/2023</a:t>
+              <a:t>14/09/2024</a:t>
             </a:fld>
             <a:endParaRPr lang="fr-FR"/>
           </a:p>
@@ -2292,7 +2324,7 @@
           <a:p>
             <a:fld id="{446AF453-C717-E044-9B61-C449088DBB9F}" type="datetime1">
               <a:rPr lang="fr-FR" smtClean="0"/>
-              <a:t>12/11/2023</a:t>
+              <a:t>14/09/2024</a:t>
             </a:fld>
             <a:endParaRPr lang="fr-FR"/>
           </a:p>
@@ -2466,7 +2498,7 @@
           <a:p>
             <a:fld id="{0AD74B8B-4B66-A54B-A7E1-EB9F6C09CE67}" type="datetime1">
               <a:rPr lang="fr-FR" smtClean="0"/>
-              <a:t>12/11/2023</a:t>
+              <a:t>14/09/2024</a:t>
             </a:fld>
             <a:endParaRPr lang="fr-FR"/>
           </a:p>
@@ -2650,7 +2682,7 @@
           <a:p>
             <a:fld id="{9584F9F2-42A0-CD42-8013-986AEAF97421}" type="datetime1">
               <a:rPr lang="fr-FR" smtClean="0"/>
-              <a:t>12/11/2023</a:t>
+              <a:t>14/09/2024</a:t>
             </a:fld>
             <a:endParaRPr lang="fr-FR"/>
           </a:p>
@@ -2824,7 +2856,7 @@
           <a:p>
             <a:fld id="{DAB9BD9F-3179-BB4C-96AB-C40862581685}" type="datetime1">
               <a:rPr lang="fr-FR" smtClean="0"/>
-              <a:t>12/11/2023</a:t>
+              <a:t>14/09/2024</a:t>
             </a:fld>
             <a:endParaRPr lang="fr-FR"/>
           </a:p>
@@ -3096,7 +3128,7 @@
           <a:p>
             <a:fld id="{A664DE96-64FF-BC43-8A9C-18ED43A528D6}" type="datetime1">
               <a:rPr lang="fr-FR" smtClean="0"/>
-              <a:t>12/11/2023</a:t>
+              <a:t>14/09/2024</a:t>
             </a:fld>
             <a:endParaRPr lang="fr-FR"/>
           </a:p>
@@ -3332,7 +3364,7 @@
           <a:p>
             <a:fld id="{2C8FE800-9F9B-1C4F-A1CD-9EF46842C4CA}" type="datetime1">
               <a:rPr lang="fr-FR" smtClean="0"/>
-              <a:t>12/11/2023</a:t>
+              <a:t>14/09/2024</a:t>
             </a:fld>
             <a:endParaRPr lang="fr-FR"/>
           </a:p>
@@ -3695,7 +3727,7 @@
           <a:p>
             <a:fld id="{0F7DED4E-8CB4-EF40-A349-EFC02EC7784E}" type="datetime1">
               <a:rPr lang="fr-FR" smtClean="0"/>
-              <a:t>12/11/2023</a:t>
+              <a:t>14/09/2024</a:t>
             </a:fld>
             <a:endParaRPr lang="fr-FR"/>
           </a:p>
@@ -3840,7 +3872,7 @@
           <a:p>
             <a:fld id="{5BB88D77-E8A2-E24F-81D2-817E60779F3E}" type="datetime1">
               <a:rPr lang="fr-FR" smtClean="0"/>
-              <a:t>12/11/2023</a:t>
+              <a:t>14/09/2024</a:t>
             </a:fld>
             <a:endParaRPr lang="fr-FR"/>
           </a:p>
@@ -3939,7 +3971,7 @@
           <a:p>
             <a:fld id="{817F964E-5B57-884A-A1B8-925BFA5276AF}" type="datetime1">
               <a:rPr lang="fr-FR" smtClean="0"/>
-              <a:t>12/11/2023</a:t>
+              <a:t>14/09/2024</a:t>
             </a:fld>
             <a:endParaRPr lang="fr-FR"/>
           </a:p>
@@ -4300,7 +4332,7 @@
           <a:p>
             <a:fld id="{D5636CD0-A2E6-1543-A0E5-C829C16FEE55}" type="datetime1">
               <a:rPr lang="fr-FR" smtClean="0"/>
-              <a:t>12/11/2023</a:t>
+              <a:t>14/09/2024</a:t>
             </a:fld>
             <a:endParaRPr lang="fr-FR"/>
           </a:p>
@@ -4661,7 +4693,7 @@
           <a:p>
             <a:fld id="{CEE5CE4A-5B1A-1846-BA66-722BDB7A9525}" type="datetime1">
               <a:rPr lang="fr-FR" smtClean="0"/>
-              <a:t>12/11/2023</a:t>
+              <a:t>14/09/2024</a:t>
             </a:fld>
             <a:endParaRPr lang="fr-FR"/>
           </a:p>
@@ -4908,7 +4940,7 @@
           <a:p>
             <a:fld id="{55A13D9C-CA6E-9C45-8634-4423EBFFD553}" type="datetime1">
               <a:rPr lang="fr-FR" smtClean="0"/>
-              <a:t>12/11/2023</a:t>
+              <a:t>14/09/2024</a:t>
             </a:fld>
             <a:endParaRPr lang="fr-FR"/>
           </a:p>
@@ -10370,8 +10402,8 @@
         </p:blipFill>
         <p:spPr>
           <a:xfrm>
-            <a:off x="1799376" y="1204916"/>
-            <a:ext cx="7841587" cy="1187494"/>
+            <a:off x="1799376" y="1173607"/>
+            <a:ext cx="7841587" cy="1518619"/>
           </a:xfrm>
           <a:prstGeom prst="rect">
             <a:avLst/>
@@ -10392,7 +10424,7 @@
         </p:nvSpPr>
         <p:spPr>
           <a:xfrm>
-            <a:off x="327035" y="2392410"/>
+            <a:off x="327035" y="2621592"/>
             <a:ext cx="11178450" cy="2862322"/>
           </a:xfrm>
           <a:prstGeom prst="rect">
@@ -10521,7 +10553,7 @@
         </p:nvSpPr>
         <p:spPr>
           <a:xfrm>
-            <a:off x="385135" y="5345308"/>
+            <a:off x="397565" y="5464703"/>
             <a:ext cx="11178450" cy="707886"/>
           </a:xfrm>
           <a:prstGeom prst="rect">

</xml_diff>